<commit_message>
Updating Readme with milestone 2 archs
</commit_message>
<xml_diff>
--- a/Docs/images/New Microsoft PowerPoint Presentation.pptx
+++ b/Docs/images/New Microsoft PowerPoint Presentation.pptx
@@ -8,6 +8,9 @@
     <p:sldId id="256" r:id="rId2"/>
     <p:sldId id="257" r:id="rId3"/>
     <p:sldId id="258" r:id="rId4"/>
+    <p:sldId id="259" r:id="rId5"/>
+    <p:sldId id="260" r:id="rId6"/>
+    <p:sldId id="261" r:id="rId7"/>
   </p:sldIdLst>
   <p:sldSz cx="12192000" cy="6858000"/>
   <p:notesSz cx="6858000" cy="9144000"/>
@@ -261,7 +264,7 @@
           <a:p>
             <a:fld id="{D3372D3B-FF1E-40D4-AFA5-7E302EC565F0}" type="datetimeFigureOut">
               <a:rPr lang="en-US" smtClean="0"/>
-              <a:t>11/25/2018</a:t>
+              <a:t>11/26/2018</a:t>
             </a:fld>
             <a:endParaRPr lang="en-US"/>
           </a:p>
@@ -459,7 +462,7 @@
           <a:p>
             <a:fld id="{D3372D3B-FF1E-40D4-AFA5-7E302EC565F0}" type="datetimeFigureOut">
               <a:rPr lang="en-US" smtClean="0"/>
-              <a:t>11/25/2018</a:t>
+              <a:t>11/26/2018</a:t>
             </a:fld>
             <a:endParaRPr lang="en-US"/>
           </a:p>
@@ -667,7 +670,7 @@
           <a:p>
             <a:fld id="{D3372D3B-FF1E-40D4-AFA5-7E302EC565F0}" type="datetimeFigureOut">
               <a:rPr lang="en-US" smtClean="0"/>
-              <a:t>11/25/2018</a:t>
+              <a:t>11/26/2018</a:t>
             </a:fld>
             <a:endParaRPr lang="en-US"/>
           </a:p>
@@ -865,7 +868,7 @@
           <a:p>
             <a:fld id="{D3372D3B-FF1E-40D4-AFA5-7E302EC565F0}" type="datetimeFigureOut">
               <a:rPr lang="en-US" smtClean="0"/>
-              <a:t>11/25/2018</a:t>
+              <a:t>11/26/2018</a:t>
             </a:fld>
             <a:endParaRPr lang="en-US"/>
           </a:p>
@@ -1140,7 +1143,7 @@
           <a:p>
             <a:fld id="{D3372D3B-FF1E-40D4-AFA5-7E302EC565F0}" type="datetimeFigureOut">
               <a:rPr lang="en-US" smtClean="0"/>
-              <a:t>11/25/2018</a:t>
+              <a:t>11/26/2018</a:t>
             </a:fld>
             <a:endParaRPr lang="en-US"/>
           </a:p>
@@ -1405,7 +1408,7 @@
           <a:p>
             <a:fld id="{D3372D3B-FF1E-40D4-AFA5-7E302EC565F0}" type="datetimeFigureOut">
               <a:rPr lang="en-US" smtClean="0"/>
-              <a:t>11/25/2018</a:t>
+              <a:t>11/26/2018</a:t>
             </a:fld>
             <a:endParaRPr lang="en-US"/>
           </a:p>
@@ -1817,7 +1820,7 @@
           <a:p>
             <a:fld id="{D3372D3B-FF1E-40D4-AFA5-7E302EC565F0}" type="datetimeFigureOut">
               <a:rPr lang="en-US" smtClean="0"/>
-              <a:t>11/25/2018</a:t>
+              <a:t>11/26/2018</a:t>
             </a:fld>
             <a:endParaRPr lang="en-US"/>
           </a:p>
@@ -1958,7 +1961,7 @@
           <a:p>
             <a:fld id="{D3372D3B-FF1E-40D4-AFA5-7E302EC565F0}" type="datetimeFigureOut">
               <a:rPr lang="en-US" smtClean="0"/>
-              <a:t>11/25/2018</a:t>
+              <a:t>11/26/2018</a:t>
             </a:fld>
             <a:endParaRPr lang="en-US"/>
           </a:p>
@@ -2071,7 +2074,7 @@
           <a:p>
             <a:fld id="{D3372D3B-FF1E-40D4-AFA5-7E302EC565F0}" type="datetimeFigureOut">
               <a:rPr lang="en-US" smtClean="0"/>
-              <a:t>11/25/2018</a:t>
+              <a:t>11/26/2018</a:t>
             </a:fld>
             <a:endParaRPr lang="en-US"/>
           </a:p>
@@ -2382,7 +2385,7 @@
           <a:p>
             <a:fld id="{D3372D3B-FF1E-40D4-AFA5-7E302EC565F0}" type="datetimeFigureOut">
               <a:rPr lang="en-US" smtClean="0"/>
-              <a:t>11/25/2018</a:t>
+              <a:t>11/26/2018</a:t>
             </a:fld>
             <a:endParaRPr lang="en-US"/>
           </a:p>
@@ -2670,7 +2673,7 @@
           <a:p>
             <a:fld id="{D3372D3B-FF1E-40D4-AFA5-7E302EC565F0}" type="datetimeFigureOut">
               <a:rPr lang="en-US" smtClean="0"/>
-              <a:t>11/25/2018</a:t>
+              <a:t>11/26/2018</a:t>
             </a:fld>
             <a:endParaRPr lang="en-US"/>
           </a:p>
@@ -2911,7 +2914,7 @@
           <a:p>
             <a:fld id="{D3372D3B-FF1E-40D4-AFA5-7E302EC565F0}" type="datetimeFigureOut">
               <a:rPr lang="en-US" smtClean="0"/>
-              <a:t>11/25/2018</a:t>
+              <a:t>11/26/2018</a:t>
             </a:fld>
             <a:endParaRPr lang="en-US"/>
           </a:p>
@@ -5062,6 +5065,4373 @@
 </p:sld>
 </file>
 
+<file path=ppt/slides/slide4.xml><?xml version="1.0" encoding="utf-8"?>
+<p:sld xmlns:a="http://schemas.openxmlformats.org/drawingml/2006/main" xmlns:r="http://schemas.openxmlformats.org/officeDocument/2006/relationships" xmlns:p="http://schemas.openxmlformats.org/presentationml/2006/main">
+  <p:cSld>
+    <p:spTree>
+      <p:nvGrpSpPr>
+        <p:cNvPr id="1" name=""/>
+        <p:cNvGrpSpPr/>
+        <p:nvPr/>
+      </p:nvGrpSpPr>
+      <p:grpSpPr>
+        <a:xfrm>
+          <a:off x="0" y="0"/>
+          <a:ext cx="0" cy="0"/>
+          <a:chOff x="0" y="0"/>
+          <a:chExt cx="0" cy="0"/>
+        </a:xfrm>
+      </p:grpSpPr>
+      <p:grpSp>
+        <p:nvGrpSpPr>
+          <p:cNvPr id="92" name="Group 91">
+            <a:extLst>
+              <a:ext uri="{FF2B5EF4-FFF2-40B4-BE49-F238E27FC236}">
+                <a16:creationId xmlns:a16="http://schemas.microsoft.com/office/drawing/2014/main" id="{4F13A41C-E1C2-42C2-AF54-E2A01AC095F7}"/>
+              </a:ext>
+            </a:extLst>
+          </p:cNvPr>
+          <p:cNvGrpSpPr/>
+          <p:nvPr/>
+        </p:nvGrpSpPr>
+        <p:grpSpPr>
+          <a:xfrm>
+            <a:off x="571026" y="275208"/>
+            <a:ext cx="10720034" cy="5424434"/>
+            <a:chOff x="571026" y="275208"/>
+            <a:chExt cx="10720034" cy="5424434"/>
+          </a:xfrm>
+        </p:grpSpPr>
+        <p:sp>
+          <p:nvSpPr>
+            <p:cNvPr id="5" name="Rectangle 4">
+              <a:extLst>
+                <a:ext uri="{FF2B5EF4-FFF2-40B4-BE49-F238E27FC236}">
+                  <a16:creationId xmlns:a16="http://schemas.microsoft.com/office/drawing/2014/main" id="{AAA8EC57-4693-4870-8E82-9F99703A88F7}"/>
+                </a:ext>
+              </a:extLst>
+            </p:cNvPr>
+            <p:cNvSpPr/>
+            <p:nvPr/>
+          </p:nvSpPr>
+          <p:spPr>
+            <a:xfrm>
+              <a:off x="571026" y="275208"/>
+              <a:ext cx="8555219" cy="5424434"/>
+            </a:xfrm>
+            <a:prstGeom prst="rect">
+              <a:avLst/>
+            </a:prstGeom>
+            <a:solidFill>
+              <a:schemeClr val="tx1">
+                <a:lumMod val="75000"/>
+                <a:lumOff val="25000"/>
+              </a:schemeClr>
+            </a:solidFill>
+          </p:spPr>
+          <p:style>
+            <a:lnRef idx="2">
+              <a:schemeClr val="accent3">
+                <a:shade val="50000"/>
+              </a:schemeClr>
+            </a:lnRef>
+            <a:fillRef idx="1">
+              <a:schemeClr val="accent3"/>
+            </a:fillRef>
+            <a:effectRef idx="0">
+              <a:schemeClr val="accent3"/>
+            </a:effectRef>
+            <a:fontRef idx="minor">
+              <a:schemeClr val="lt1"/>
+            </a:fontRef>
+          </p:style>
+          <p:txBody>
+            <a:bodyPr rtlCol="0" anchor="ctr"/>
+            <a:lstStyle/>
+            <a:p>
+              <a:pPr algn="ctr"/>
+              <a:endParaRPr lang="en-US" dirty="0"/>
+            </a:p>
+          </p:txBody>
+        </p:sp>
+        <p:sp>
+          <p:nvSpPr>
+            <p:cNvPr id="29" name="Rectangle 28">
+              <a:extLst>
+                <a:ext uri="{FF2B5EF4-FFF2-40B4-BE49-F238E27FC236}">
+                  <a16:creationId xmlns:a16="http://schemas.microsoft.com/office/drawing/2014/main" id="{7B7F99E5-13FB-4B92-B961-25C491E6BA21}"/>
+                </a:ext>
+              </a:extLst>
+            </p:cNvPr>
+            <p:cNvSpPr/>
+            <p:nvPr/>
+          </p:nvSpPr>
+          <p:spPr>
+            <a:xfrm>
+              <a:off x="5058632" y="2796540"/>
+              <a:ext cx="1857608" cy="2748485"/>
+            </a:xfrm>
+            <a:prstGeom prst="rect">
+              <a:avLst/>
+            </a:prstGeom>
+          </p:spPr>
+          <p:style>
+            <a:lnRef idx="2">
+              <a:schemeClr val="accent6">
+                <a:shade val="50000"/>
+              </a:schemeClr>
+            </a:lnRef>
+            <a:fillRef idx="1">
+              <a:schemeClr val="accent6"/>
+            </a:fillRef>
+            <a:effectRef idx="0">
+              <a:schemeClr val="accent6"/>
+            </a:effectRef>
+            <a:fontRef idx="minor">
+              <a:schemeClr val="lt1"/>
+            </a:fontRef>
+          </p:style>
+          <p:txBody>
+            <a:bodyPr rtlCol="0" anchor="ctr"/>
+            <a:lstStyle/>
+            <a:p>
+              <a:pPr algn="ctr"/>
+              <a:endParaRPr lang="en-US" dirty="0"/>
+            </a:p>
+          </p:txBody>
+        </p:sp>
+        <p:grpSp>
+          <p:nvGrpSpPr>
+            <p:cNvPr id="75" name="Group 74">
+              <a:extLst>
+                <a:ext uri="{FF2B5EF4-FFF2-40B4-BE49-F238E27FC236}">
+                  <a16:creationId xmlns:a16="http://schemas.microsoft.com/office/drawing/2014/main" id="{30CFE205-650C-4469-91E1-A83A770D827F}"/>
+                </a:ext>
+              </a:extLst>
+            </p:cNvPr>
+            <p:cNvGrpSpPr/>
+            <p:nvPr/>
+          </p:nvGrpSpPr>
+          <p:grpSpPr>
+            <a:xfrm>
+              <a:off x="9203286" y="275208"/>
+              <a:ext cx="2087774" cy="5424434"/>
+              <a:chOff x="9203286" y="275208"/>
+              <a:chExt cx="2087774" cy="5424434"/>
+            </a:xfrm>
+          </p:grpSpPr>
+          <p:sp>
+            <p:nvSpPr>
+              <p:cNvPr id="34" name="Rectangle 33">
+                <a:extLst>
+                  <a:ext uri="{FF2B5EF4-FFF2-40B4-BE49-F238E27FC236}">
+                    <a16:creationId xmlns:a16="http://schemas.microsoft.com/office/drawing/2014/main" id="{230793B6-5CC8-47A3-A106-15ADD3382388}"/>
+                  </a:ext>
+                </a:extLst>
+              </p:cNvPr>
+              <p:cNvSpPr/>
+              <p:nvPr/>
+            </p:nvSpPr>
+            <p:spPr>
+              <a:xfrm>
+                <a:off x="9203286" y="275208"/>
+                <a:ext cx="2071471" cy="5424434"/>
+              </a:xfrm>
+              <a:prstGeom prst="rect">
+                <a:avLst/>
+              </a:prstGeom>
+            </p:spPr>
+            <p:style>
+              <a:lnRef idx="2">
+                <a:schemeClr val="dk1"/>
+              </a:lnRef>
+              <a:fillRef idx="1">
+                <a:schemeClr val="lt1"/>
+              </a:fillRef>
+              <a:effectRef idx="0">
+                <a:schemeClr val="dk1"/>
+              </a:effectRef>
+              <a:fontRef idx="minor">
+                <a:schemeClr val="dk1"/>
+              </a:fontRef>
+            </p:style>
+            <p:txBody>
+              <a:bodyPr rtlCol="0" anchor="ctr"/>
+              <a:lstStyle/>
+              <a:p>
+                <a:pPr algn="ctr"/>
+                <a:endParaRPr lang="en-US"/>
+              </a:p>
+            </p:txBody>
+          </p:sp>
+          <p:sp>
+            <p:nvSpPr>
+              <p:cNvPr id="30" name="Rectangle 29">
+                <a:extLst>
+                  <a:ext uri="{FF2B5EF4-FFF2-40B4-BE49-F238E27FC236}">
+                    <a16:creationId xmlns:a16="http://schemas.microsoft.com/office/drawing/2014/main" id="{1D7095D5-931D-4229-8724-4632A942FD05}"/>
+                  </a:ext>
+                </a:extLst>
+              </p:cNvPr>
+              <p:cNvSpPr/>
+              <p:nvPr/>
+            </p:nvSpPr>
+            <p:spPr>
+              <a:xfrm>
+                <a:off x="9283273" y="2197312"/>
+                <a:ext cx="301841" cy="248575"/>
+              </a:xfrm>
+              <a:prstGeom prst="rect">
+                <a:avLst/>
+              </a:prstGeom>
+            </p:spPr>
+            <p:style>
+              <a:lnRef idx="2">
+                <a:schemeClr val="accent1">
+                  <a:shade val="50000"/>
+                </a:schemeClr>
+              </a:lnRef>
+              <a:fillRef idx="1">
+                <a:schemeClr val="accent1"/>
+              </a:fillRef>
+              <a:effectRef idx="0">
+                <a:schemeClr val="accent1"/>
+              </a:effectRef>
+              <a:fontRef idx="minor">
+                <a:schemeClr val="lt1"/>
+              </a:fontRef>
+            </p:style>
+            <p:txBody>
+              <a:bodyPr rtlCol="0" anchor="ctr"/>
+              <a:lstStyle/>
+              <a:p>
+                <a:pPr algn="ctr"/>
+                <a:endParaRPr lang="en-US"/>
+              </a:p>
+            </p:txBody>
+          </p:sp>
+          <p:sp>
+            <p:nvSpPr>
+              <p:cNvPr id="31" name="Rectangle 30">
+                <a:extLst>
+                  <a:ext uri="{FF2B5EF4-FFF2-40B4-BE49-F238E27FC236}">
+                    <a16:creationId xmlns:a16="http://schemas.microsoft.com/office/drawing/2014/main" id="{D874102D-4BA9-47E9-9935-3526FE791A4F}"/>
+                  </a:ext>
+                </a:extLst>
+              </p:cNvPr>
+              <p:cNvSpPr/>
+              <p:nvPr/>
+            </p:nvSpPr>
+            <p:spPr>
+              <a:xfrm>
+                <a:off x="9292063" y="2738850"/>
+                <a:ext cx="301841" cy="248575"/>
+              </a:xfrm>
+              <a:prstGeom prst="rect">
+                <a:avLst/>
+              </a:prstGeom>
+            </p:spPr>
+            <p:style>
+              <a:lnRef idx="2">
+                <a:schemeClr val="accent2">
+                  <a:shade val="50000"/>
+                </a:schemeClr>
+              </a:lnRef>
+              <a:fillRef idx="1">
+                <a:schemeClr val="accent2"/>
+              </a:fillRef>
+              <a:effectRef idx="0">
+                <a:schemeClr val="accent2"/>
+              </a:effectRef>
+              <a:fontRef idx="minor">
+                <a:schemeClr val="lt1"/>
+              </a:fontRef>
+            </p:style>
+            <p:txBody>
+              <a:bodyPr rtlCol="0" anchor="ctr"/>
+              <a:lstStyle/>
+              <a:p>
+                <a:pPr algn="ctr"/>
+                <a:endParaRPr lang="en-US"/>
+              </a:p>
+            </p:txBody>
+          </p:sp>
+          <p:sp>
+            <p:nvSpPr>
+              <p:cNvPr id="32" name="Rectangle 31">
+                <a:extLst>
+                  <a:ext uri="{FF2B5EF4-FFF2-40B4-BE49-F238E27FC236}">
+                    <a16:creationId xmlns:a16="http://schemas.microsoft.com/office/drawing/2014/main" id="{D770BE93-2D48-4F96-AD26-47E725C98100}"/>
+                  </a:ext>
+                </a:extLst>
+              </p:cNvPr>
+              <p:cNvSpPr/>
+              <p:nvPr/>
+            </p:nvSpPr>
+            <p:spPr>
+              <a:xfrm>
+                <a:off x="9292063" y="3280388"/>
+                <a:ext cx="301841" cy="248575"/>
+              </a:xfrm>
+              <a:prstGeom prst="rect">
+                <a:avLst/>
+              </a:prstGeom>
+            </p:spPr>
+            <p:style>
+              <a:lnRef idx="2">
+                <a:schemeClr val="accent6">
+                  <a:shade val="50000"/>
+                </a:schemeClr>
+              </a:lnRef>
+              <a:fillRef idx="1">
+                <a:schemeClr val="accent6"/>
+              </a:fillRef>
+              <a:effectRef idx="0">
+                <a:schemeClr val="accent6"/>
+              </a:effectRef>
+              <a:fontRef idx="minor">
+                <a:schemeClr val="lt1"/>
+              </a:fontRef>
+            </p:style>
+            <p:txBody>
+              <a:bodyPr rtlCol="0" anchor="ctr"/>
+              <a:lstStyle/>
+              <a:p>
+                <a:pPr algn="ctr"/>
+                <a:endParaRPr lang="en-US"/>
+              </a:p>
+            </p:txBody>
+          </p:sp>
+          <p:sp>
+            <p:nvSpPr>
+              <p:cNvPr id="44" name="TextBox 43">
+                <a:extLst>
+                  <a:ext uri="{FF2B5EF4-FFF2-40B4-BE49-F238E27FC236}">
+                    <a16:creationId xmlns:a16="http://schemas.microsoft.com/office/drawing/2014/main" id="{C9D39837-B77A-4394-B9AD-FB7073069E29}"/>
+                  </a:ext>
+                </a:extLst>
+              </p:cNvPr>
+              <p:cNvSpPr txBox="1"/>
+              <p:nvPr/>
+            </p:nvSpPr>
+            <p:spPr>
+              <a:xfrm>
+                <a:off x="9630156" y="2172680"/>
+                <a:ext cx="1660904" cy="276999"/>
+              </a:xfrm>
+              <a:prstGeom prst="rect">
+                <a:avLst/>
+              </a:prstGeom>
+              <a:noFill/>
+            </p:spPr>
+            <p:txBody>
+              <a:bodyPr wrap="none" rtlCol="0">
+                <a:spAutoFit/>
+              </a:bodyPr>
+              <a:lstStyle/>
+              <a:p>
+                <a:r>
+                  <a:rPr lang="en-US" sz="1200" dirty="0"/>
+                  <a:t>Unordered Access View</a:t>
+                </a:r>
+              </a:p>
+            </p:txBody>
+          </p:sp>
+          <p:sp>
+            <p:nvSpPr>
+              <p:cNvPr id="45" name="TextBox 44">
+                <a:extLst>
+                  <a:ext uri="{FF2B5EF4-FFF2-40B4-BE49-F238E27FC236}">
+                    <a16:creationId xmlns:a16="http://schemas.microsoft.com/office/drawing/2014/main" id="{F6C4F473-E2A6-440E-8CA8-766E35C69E16}"/>
+                  </a:ext>
+                </a:extLst>
+              </p:cNvPr>
+              <p:cNvSpPr txBox="1"/>
+              <p:nvPr/>
+            </p:nvSpPr>
+            <p:spPr>
+              <a:xfrm>
+                <a:off x="9629423" y="2724637"/>
+                <a:ext cx="1571969" cy="276999"/>
+              </a:xfrm>
+              <a:prstGeom prst="rect">
+                <a:avLst/>
+              </a:prstGeom>
+              <a:noFill/>
+            </p:spPr>
+            <p:txBody>
+              <a:bodyPr wrap="none" rtlCol="0">
+                <a:spAutoFit/>
+              </a:bodyPr>
+              <a:lstStyle/>
+              <a:p>
+                <a:r>
+                  <a:rPr lang="en-US" sz="1200" dirty="0"/>
+                  <a:t>Shader Resource View</a:t>
+                </a:r>
+              </a:p>
+            </p:txBody>
+          </p:sp>
+          <p:sp>
+            <p:nvSpPr>
+              <p:cNvPr id="46" name="TextBox 45">
+                <a:extLst>
+                  <a:ext uri="{FF2B5EF4-FFF2-40B4-BE49-F238E27FC236}">
+                    <a16:creationId xmlns:a16="http://schemas.microsoft.com/office/drawing/2014/main" id="{1E285210-74DB-4730-A998-41B25D02561F}"/>
+                  </a:ext>
+                </a:extLst>
+              </p:cNvPr>
+              <p:cNvSpPr txBox="1"/>
+              <p:nvPr/>
+            </p:nvSpPr>
+            <p:spPr>
+              <a:xfrm>
+                <a:off x="9629423" y="3278623"/>
+                <a:ext cx="1500860" cy="276999"/>
+              </a:xfrm>
+              <a:prstGeom prst="rect">
+                <a:avLst/>
+              </a:prstGeom>
+              <a:noFill/>
+            </p:spPr>
+            <p:txBody>
+              <a:bodyPr wrap="none" rtlCol="0">
+                <a:spAutoFit/>
+              </a:bodyPr>
+              <a:lstStyle/>
+              <a:p>
+                <a:r>
+                  <a:rPr lang="en-US" sz="1200" dirty="0"/>
+                  <a:t>Constant Buffer View</a:t>
+                </a:r>
+              </a:p>
+            </p:txBody>
+          </p:sp>
+        </p:grpSp>
+        <p:grpSp>
+          <p:nvGrpSpPr>
+            <p:cNvPr id="71" name="Group 70">
+              <a:extLst>
+                <a:ext uri="{FF2B5EF4-FFF2-40B4-BE49-F238E27FC236}">
+                  <a16:creationId xmlns:a16="http://schemas.microsoft.com/office/drawing/2014/main" id="{520D36E9-F282-4B81-93FE-865E1965C096}"/>
+                </a:ext>
+              </a:extLst>
+            </p:cNvPr>
+            <p:cNvGrpSpPr/>
+            <p:nvPr/>
+          </p:nvGrpSpPr>
+          <p:grpSpPr>
+            <a:xfrm>
+              <a:off x="681336" y="949911"/>
+              <a:ext cx="1822168" cy="1642369"/>
+              <a:chOff x="681336" y="949911"/>
+              <a:chExt cx="1822168" cy="1642369"/>
+            </a:xfrm>
+          </p:grpSpPr>
+          <p:sp>
+            <p:nvSpPr>
+              <p:cNvPr id="25" name="Rectangle 24">
+                <a:extLst>
+                  <a:ext uri="{FF2B5EF4-FFF2-40B4-BE49-F238E27FC236}">
+                    <a16:creationId xmlns:a16="http://schemas.microsoft.com/office/drawing/2014/main" id="{ED209FF5-7E8F-4D39-8551-D829E6A85F78}"/>
+                  </a:ext>
+                </a:extLst>
+              </p:cNvPr>
+              <p:cNvSpPr/>
+              <p:nvPr/>
+            </p:nvSpPr>
+            <p:spPr>
+              <a:xfrm>
+                <a:off x="681336" y="949911"/>
+                <a:ext cx="1822168" cy="1642369"/>
+              </a:xfrm>
+              <a:prstGeom prst="rect">
+                <a:avLst/>
+              </a:prstGeom>
+            </p:spPr>
+            <p:style>
+              <a:lnRef idx="2">
+                <a:schemeClr val="accent1">
+                  <a:shade val="50000"/>
+                </a:schemeClr>
+              </a:lnRef>
+              <a:fillRef idx="1">
+                <a:schemeClr val="accent1"/>
+              </a:fillRef>
+              <a:effectRef idx="0">
+                <a:schemeClr val="accent1"/>
+              </a:effectRef>
+              <a:fontRef idx="minor">
+                <a:schemeClr val="lt1"/>
+              </a:fontRef>
+            </p:style>
+            <p:txBody>
+              <a:bodyPr rtlCol="0" anchor="ctr"/>
+              <a:lstStyle/>
+              <a:p>
+                <a:pPr algn="ctr"/>
+                <a:endParaRPr lang="en-US" dirty="0"/>
+              </a:p>
+            </p:txBody>
+          </p:sp>
+          <p:sp>
+            <p:nvSpPr>
+              <p:cNvPr id="35" name="TextBox 34">
+                <a:extLst>
+                  <a:ext uri="{FF2B5EF4-FFF2-40B4-BE49-F238E27FC236}">
+                    <a16:creationId xmlns:a16="http://schemas.microsoft.com/office/drawing/2014/main" id="{65BB890E-896E-412D-BF0B-EDD0C3E2B9FC}"/>
+                  </a:ext>
+                </a:extLst>
+              </p:cNvPr>
+              <p:cNvSpPr txBox="1"/>
+              <p:nvPr/>
+            </p:nvSpPr>
+            <p:spPr>
+              <a:xfrm>
+                <a:off x="867637" y="978748"/>
+                <a:ext cx="1440331" cy="369332"/>
+              </a:xfrm>
+              <a:prstGeom prst="rect">
+                <a:avLst/>
+              </a:prstGeom>
+              <a:noFill/>
+            </p:spPr>
+            <p:txBody>
+              <a:bodyPr wrap="none" rtlCol="0">
+                <a:spAutoFit/>
+              </a:bodyPr>
+              <a:lstStyle/>
+              <a:p>
+                <a:r>
+                  <a:rPr lang="en-US" dirty="0"/>
+                  <a:t>RenderTarget</a:t>
+                </a:r>
+              </a:p>
+            </p:txBody>
+          </p:sp>
+          <p:sp>
+            <p:nvSpPr>
+              <p:cNvPr id="47" name="TextBox 46">
+                <a:extLst>
+                  <a:ext uri="{FF2B5EF4-FFF2-40B4-BE49-F238E27FC236}">
+                    <a16:creationId xmlns:a16="http://schemas.microsoft.com/office/drawing/2014/main" id="{178F5F23-D956-4EB1-8CC2-E4EB99D7D708}"/>
+                  </a:ext>
+                </a:extLst>
+              </p:cNvPr>
+              <p:cNvSpPr txBox="1"/>
+              <p:nvPr/>
+            </p:nvSpPr>
+            <p:spPr>
+              <a:xfrm>
+                <a:off x="917243" y="1384831"/>
+                <a:ext cx="1201290" cy="461665"/>
+              </a:xfrm>
+              <a:prstGeom prst="rect">
+                <a:avLst/>
+              </a:prstGeom>
+              <a:noFill/>
+            </p:spPr>
+            <p:txBody>
+              <a:bodyPr wrap="none" rtlCol="0">
+                <a:spAutoFit/>
+              </a:bodyPr>
+              <a:lstStyle/>
+              <a:p>
+                <a:pPr algn="ctr"/>
+                <a:r>
+                  <a:rPr lang="en-US" sz="1200" b="1" dirty="0"/>
+                  <a:t>Format</a:t>
+                </a:r>
+                <a:br>
+                  <a:rPr lang="en-US" sz="1200" dirty="0"/>
+                </a:br>
+                <a:r>
+                  <a:rPr lang="en-US" sz="1200" dirty="0"/>
+                  <a:t> RGBA UNORM8</a:t>
+                </a:r>
+              </a:p>
+            </p:txBody>
+          </p:sp>
+          <p:sp>
+            <p:nvSpPr>
+              <p:cNvPr id="48" name="TextBox 47">
+                <a:extLst>
+                  <a:ext uri="{FF2B5EF4-FFF2-40B4-BE49-F238E27FC236}">
+                    <a16:creationId xmlns:a16="http://schemas.microsoft.com/office/drawing/2014/main" id="{82EED7B0-A137-4749-A64C-F04F2E72350F}"/>
+                  </a:ext>
+                </a:extLst>
+              </p:cNvPr>
+              <p:cNvSpPr txBox="1"/>
+              <p:nvPr/>
+            </p:nvSpPr>
+            <p:spPr>
+              <a:xfrm>
+                <a:off x="818234" y="1857929"/>
+                <a:ext cx="1539139" cy="461665"/>
+              </a:xfrm>
+              <a:prstGeom prst="rect">
+                <a:avLst/>
+              </a:prstGeom>
+              <a:noFill/>
+            </p:spPr>
+            <p:txBody>
+              <a:bodyPr wrap="none" rtlCol="0">
+                <a:spAutoFit/>
+              </a:bodyPr>
+              <a:lstStyle/>
+              <a:p>
+                <a:pPr algn="ctr"/>
+                <a:r>
+                  <a:rPr lang="en-US" sz="1200" b="1" dirty="0"/>
+                  <a:t>Width</a:t>
+                </a:r>
+                <a:r>
+                  <a:rPr lang="en-US" sz="1200" dirty="0"/>
+                  <a:t>: Screen Width</a:t>
+                </a:r>
+              </a:p>
+              <a:p>
+                <a:pPr algn="ctr"/>
+                <a:r>
+                  <a:rPr lang="en-US" sz="1200" b="1" dirty="0"/>
+                  <a:t>Height</a:t>
+                </a:r>
+                <a:r>
+                  <a:rPr lang="en-US" sz="1200" dirty="0"/>
+                  <a:t>: Screen Height</a:t>
+                </a:r>
+              </a:p>
+            </p:txBody>
+          </p:sp>
+        </p:grpSp>
+        <p:grpSp>
+          <p:nvGrpSpPr>
+            <p:cNvPr id="72" name="Group 71">
+              <a:extLst>
+                <a:ext uri="{FF2B5EF4-FFF2-40B4-BE49-F238E27FC236}">
+                  <a16:creationId xmlns:a16="http://schemas.microsoft.com/office/drawing/2014/main" id="{C7ECA9FC-EABB-4962-8258-8DEF3E703F9D}"/>
+                </a:ext>
+              </a:extLst>
+            </p:cNvPr>
+            <p:cNvGrpSpPr/>
+            <p:nvPr/>
+          </p:nvGrpSpPr>
+          <p:grpSpPr>
+            <a:xfrm>
+              <a:off x="2634919" y="939125"/>
+              <a:ext cx="1776890" cy="1642369"/>
+              <a:chOff x="2707860" y="949911"/>
+              <a:chExt cx="1776890" cy="1642369"/>
+            </a:xfrm>
+          </p:grpSpPr>
+          <p:sp>
+            <p:nvSpPr>
+              <p:cNvPr id="26" name="Rectangle 25">
+                <a:extLst>
+                  <a:ext uri="{FF2B5EF4-FFF2-40B4-BE49-F238E27FC236}">
+                    <a16:creationId xmlns:a16="http://schemas.microsoft.com/office/drawing/2014/main" id="{A0EFE290-6101-4D8E-BA29-F5B43A402C90}"/>
+                  </a:ext>
+                </a:extLst>
+              </p:cNvPr>
+              <p:cNvSpPr/>
+              <p:nvPr/>
+            </p:nvSpPr>
+            <p:spPr>
+              <a:xfrm>
+                <a:off x="2707860" y="949911"/>
+                <a:ext cx="1776890" cy="1642369"/>
+              </a:xfrm>
+              <a:prstGeom prst="rect">
+                <a:avLst/>
+              </a:prstGeom>
+            </p:spPr>
+            <p:style>
+              <a:lnRef idx="2">
+                <a:schemeClr val="accent1">
+                  <a:shade val="50000"/>
+                </a:schemeClr>
+              </a:lnRef>
+              <a:fillRef idx="1">
+                <a:schemeClr val="accent1"/>
+              </a:fillRef>
+              <a:effectRef idx="0">
+                <a:schemeClr val="accent1"/>
+              </a:effectRef>
+              <a:fontRef idx="minor">
+                <a:schemeClr val="lt1"/>
+              </a:fontRef>
+            </p:style>
+            <p:txBody>
+              <a:bodyPr rtlCol="0" anchor="ctr"/>
+              <a:lstStyle/>
+              <a:p>
+                <a:pPr algn="ctr"/>
+                <a:endParaRPr lang="en-US" dirty="0"/>
+              </a:p>
+            </p:txBody>
+          </p:sp>
+          <p:sp>
+            <p:nvSpPr>
+              <p:cNvPr id="36" name="TextBox 35">
+                <a:extLst>
+                  <a:ext uri="{FF2B5EF4-FFF2-40B4-BE49-F238E27FC236}">
+                    <a16:creationId xmlns:a16="http://schemas.microsoft.com/office/drawing/2014/main" id="{D8BF7E7B-E2A1-424F-8427-27C4232F14EF}"/>
+                  </a:ext>
+                </a:extLst>
+              </p:cNvPr>
+              <p:cNvSpPr txBox="1"/>
+              <p:nvPr/>
+            </p:nvSpPr>
+            <p:spPr>
+              <a:xfrm>
+                <a:off x="2907734" y="950517"/>
+                <a:ext cx="1443408" cy="369332"/>
+              </a:xfrm>
+              <a:prstGeom prst="rect">
+                <a:avLst/>
+              </a:prstGeom>
+              <a:noFill/>
+            </p:spPr>
+            <p:txBody>
+              <a:bodyPr wrap="none" rtlCol="0">
+                <a:spAutoFit/>
+              </a:bodyPr>
+              <a:lstStyle/>
+              <a:p>
+                <a:r>
+                  <a:rPr lang="en-US" dirty="0"/>
+                  <a:t>StagingBuffer</a:t>
+                </a:r>
+              </a:p>
+            </p:txBody>
+          </p:sp>
+          <p:sp>
+            <p:nvSpPr>
+              <p:cNvPr id="49" name="TextBox 48">
+                <a:extLst>
+                  <a:ext uri="{FF2B5EF4-FFF2-40B4-BE49-F238E27FC236}">
+                    <a16:creationId xmlns:a16="http://schemas.microsoft.com/office/drawing/2014/main" id="{4CE2A858-90F6-4ABC-BE18-95ABA11BD2D6}"/>
+                  </a:ext>
+                </a:extLst>
+              </p:cNvPr>
+              <p:cNvSpPr txBox="1"/>
+              <p:nvPr/>
+            </p:nvSpPr>
+            <p:spPr>
+              <a:xfrm>
+                <a:off x="2977165" y="1309430"/>
+                <a:ext cx="1148841" cy="461665"/>
+              </a:xfrm>
+              <a:prstGeom prst="rect">
+                <a:avLst/>
+              </a:prstGeom>
+              <a:noFill/>
+            </p:spPr>
+            <p:txBody>
+              <a:bodyPr wrap="none" rtlCol="0">
+                <a:spAutoFit/>
+              </a:bodyPr>
+              <a:lstStyle/>
+              <a:p>
+                <a:pPr algn="ctr"/>
+                <a:r>
+                  <a:rPr lang="en-US" sz="1200" b="1" dirty="0"/>
+                  <a:t>Format</a:t>
+                </a:r>
+                <a:br>
+                  <a:rPr lang="en-US" sz="1200" dirty="0"/>
+                </a:br>
+                <a:r>
+                  <a:rPr lang="en-US" sz="1200" dirty="0"/>
+                  <a:t> RGBA FLOAT32</a:t>
+                </a:r>
+              </a:p>
+            </p:txBody>
+          </p:sp>
+          <p:sp>
+            <p:nvSpPr>
+              <p:cNvPr id="50" name="TextBox 49">
+                <a:extLst>
+                  <a:ext uri="{FF2B5EF4-FFF2-40B4-BE49-F238E27FC236}">
+                    <a16:creationId xmlns:a16="http://schemas.microsoft.com/office/drawing/2014/main" id="{7186D229-7914-4827-8ED3-209253F54228}"/>
+                  </a:ext>
+                </a:extLst>
+              </p:cNvPr>
+              <p:cNvSpPr txBox="1"/>
+              <p:nvPr/>
+            </p:nvSpPr>
+            <p:spPr>
+              <a:xfrm>
+                <a:off x="2903775" y="1720022"/>
+                <a:ext cx="1385059" cy="461665"/>
+              </a:xfrm>
+              <a:prstGeom prst="rect">
+                <a:avLst/>
+              </a:prstGeom>
+              <a:noFill/>
+            </p:spPr>
+            <p:txBody>
+              <a:bodyPr wrap="none" rtlCol="0">
+                <a:spAutoFit/>
+              </a:bodyPr>
+              <a:lstStyle/>
+              <a:p>
+                <a:pPr algn="ctr"/>
+                <a:r>
+                  <a:rPr lang="en-US" sz="1200" b="1" dirty="0"/>
+                  <a:t>RGB</a:t>
+                </a:r>
+                <a:r>
+                  <a:rPr lang="en-US" sz="1200" dirty="0"/>
+                  <a:t> – Screen Color</a:t>
+                </a:r>
+              </a:p>
+              <a:p>
+                <a:pPr algn="ctr"/>
+                <a:r>
+                  <a:rPr lang="en-US" sz="1200" b="1" dirty="0"/>
+                  <a:t>A</a:t>
+                </a:r>
+                <a:r>
+                  <a:rPr lang="en-US" sz="1200" dirty="0"/>
+                  <a:t> – Num Photons</a:t>
+                </a:r>
+              </a:p>
+            </p:txBody>
+          </p:sp>
+          <p:sp>
+            <p:nvSpPr>
+              <p:cNvPr id="52" name="TextBox 51">
+                <a:extLst>
+                  <a:ext uri="{FF2B5EF4-FFF2-40B4-BE49-F238E27FC236}">
+                    <a16:creationId xmlns:a16="http://schemas.microsoft.com/office/drawing/2014/main" id="{CB7D6052-4EE9-4DE2-A1A9-C9FD2B80DDA2}"/>
+                  </a:ext>
+                </a:extLst>
+              </p:cNvPr>
+              <p:cNvSpPr txBox="1"/>
+              <p:nvPr/>
+            </p:nvSpPr>
+            <p:spPr>
+              <a:xfrm>
+                <a:off x="2826734" y="2120195"/>
+                <a:ext cx="1539139" cy="461665"/>
+              </a:xfrm>
+              <a:prstGeom prst="rect">
+                <a:avLst/>
+              </a:prstGeom>
+              <a:noFill/>
+            </p:spPr>
+            <p:txBody>
+              <a:bodyPr wrap="none" rtlCol="0">
+                <a:spAutoFit/>
+              </a:bodyPr>
+              <a:lstStyle/>
+              <a:p>
+                <a:pPr algn="ctr"/>
+                <a:r>
+                  <a:rPr lang="en-US" sz="1200" b="1" dirty="0"/>
+                  <a:t>Width</a:t>
+                </a:r>
+                <a:r>
+                  <a:rPr lang="en-US" sz="1200" dirty="0"/>
+                  <a:t>: Screen Width</a:t>
+                </a:r>
+              </a:p>
+              <a:p>
+                <a:pPr algn="ctr"/>
+                <a:r>
+                  <a:rPr lang="en-US" sz="1200" b="1" dirty="0"/>
+                  <a:t>Height</a:t>
+                </a:r>
+                <a:r>
+                  <a:rPr lang="en-US" sz="1200" dirty="0"/>
+                  <a:t>: Screen Height</a:t>
+                </a:r>
+              </a:p>
+            </p:txBody>
+          </p:sp>
+        </p:grpSp>
+        <p:sp>
+          <p:nvSpPr>
+            <p:cNvPr id="27" name="Rectangle 26">
+              <a:extLst>
+                <a:ext uri="{FF2B5EF4-FFF2-40B4-BE49-F238E27FC236}">
+                  <a16:creationId xmlns:a16="http://schemas.microsoft.com/office/drawing/2014/main" id="{2C397E8B-E827-4375-89C1-9A6EBDBA4DBF}"/>
+                </a:ext>
+              </a:extLst>
+            </p:cNvPr>
+            <p:cNvSpPr/>
+            <p:nvPr/>
+          </p:nvSpPr>
+          <p:spPr>
+            <a:xfrm>
+              <a:off x="681337" y="2821876"/>
+              <a:ext cx="4240053" cy="2723150"/>
+            </a:xfrm>
+            <a:prstGeom prst="rect">
+              <a:avLst/>
+            </a:prstGeom>
+          </p:spPr>
+          <p:style>
+            <a:lnRef idx="2">
+              <a:schemeClr val="accent1">
+                <a:shade val="50000"/>
+              </a:schemeClr>
+            </a:lnRef>
+            <a:fillRef idx="1">
+              <a:schemeClr val="accent1"/>
+            </a:fillRef>
+            <a:effectRef idx="0">
+              <a:schemeClr val="accent1"/>
+            </a:effectRef>
+            <a:fontRef idx="minor">
+              <a:schemeClr val="lt1"/>
+            </a:fontRef>
+          </p:style>
+          <p:txBody>
+            <a:bodyPr rtlCol="0" anchor="ctr"/>
+            <a:lstStyle/>
+            <a:p>
+              <a:pPr algn="ctr"/>
+              <a:endParaRPr lang="en-US" dirty="0"/>
+            </a:p>
+          </p:txBody>
+        </p:sp>
+        <p:sp>
+          <p:nvSpPr>
+            <p:cNvPr id="37" name="TextBox 36">
+              <a:extLst>
+                <a:ext uri="{FF2B5EF4-FFF2-40B4-BE49-F238E27FC236}">
+                  <a16:creationId xmlns:a16="http://schemas.microsoft.com/office/drawing/2014/main" id="{FE716224-61FC-4AFD-B164-EB9DD875B339}"/>
+                </a:ext>
+              </a:extLst>
+            </p:cNvPr>
+            <p:cNvSpPr txBox="1"/>
+            <p:nvPr/>
+          </p:nvSpPr>
+          <p:spPr>
+            <a:xfrm>
+              <a:off x="621462" y="2942932"/>
+              <a:ext cx="964559" cy="369332"/>
+            </a:xfrm>
+            <a:prstGeom prst="rect">
+              <a:avLst/>
+            </a:prstGeom>
+            <a:noFill/>
+          </p:spPr>
+          <p:txBody>
+            <a:bodyPr wrap="none" rtlCol="0">
+              <a:spAutoFit/>
+            </a:bodyPr>
+            <a:lstStyle/>
+            <a:p>
+              <a:r>
+                <a:rPr lang="en-US" dirty="0"/>
+                <a:t>PBuffers</a:t>
+              </a:r>
+            </a:p>
+          </p:txBody>
+        </p:sp>
+        <p:sp>
+          <p:nvSpPr>
+            <p:cNvPr id="55" name="Rectangle 54">
+              <a:extLst>
+                <a:ext uri="{FF2B5EF4-FFF2-40B4-BE49-F238E27FC236}">
+                  <a16:creationId xmlns:a16="http://schemas.microsoft.com/office/drawing/2014/main" id="{0444B37E-FD37-42FC-98A5-013A555CEEF7}"/>
+                </a:ext>
+              </a:extLst>
+            </p:cNvPr>
+            <p:cNvSpPr/>
+            <p:nvPr/>
+          </p:nvSpPr>
+          <p:spPr>
+            <a:xfrm>
+              <a:off x="3408547" y="2943774"/>
+              <a:ext cx="1008660" cy="793811"/>
+            </a:xfrm>
+            <a:prstGeom prst="rect">
+              <a:avLst/>
+            </a:prstGeom>
+          </p:spPr>
+          <p:style>
+            <a:lnRef idx="1">
+              <a:schemeClr val="accent1"/>
+            </a:lnRef>
+            <a:fillRef idx="2">
+              <a:schemeClr val="accent1"/>
+            </a:fillRef>
+            <a:effectRef idx="1">
+              <a:schemeClr val="accent1"/>
+            </a:effectRef>
+            <a:fontRef idx="minor">
+              <a:schemeClr val="dk1"/>
+            </a:fontRef>
+          </p:style>
+          <p:txBody>
+            <a:bodyPr rtlCol="0" anchor="ctr"/>
+            <a:lstStyle/>
+            <a:p>
+              <a:pPr algn="ctr"/>
+              <a:endParaRPr lang="en-US"/>
+            </a:p>
+          </p:txBody>
+        </p:sp>
+        <p:sp>
+          <p:nvSpPr>
+            <p:cNvPr id="56" name="Rectangle 55">
+              <a:extLst>
+                <a:ext uri="{FF2B5EF4-FFF2-40B4-BE49-F238E27FC236}">
+                  <a16:creationId xmlns:a16="http://schemas.microsoft.com/office/drawing/2014/main" id="{39D4D8E2-13A4-4D53-BAE9-2374AECECF55}"/>
+                </a:ext>
+              </a:extLst>
+            </p:cNvPr>
+            <p:cNvSpPr/>
+            <p:nvPr/>
+          </p:nvSpPr>
+          <p:spPr>
+            <a:xfrm>
+              <a:off x="1579964" y="2943774"/>
+              <a:ext cx="1008660" cy="793811"/>
+            </a:xfrm>
+            <a:prstGeom prst="rect">
+              <a:avLst/>
+            </a:prstGeom>
+          </p:spPr>
+          <p:style>
+            <a:lnRef idx="1">
+              <a:schemeClr val="accent1"/>
+            </a:lnRef>
+            <a:fillRef idx="2">
+              <a:schemeClr val="accent1"/>
+            </a:fillRef>
+            <a:effectRef idx="1">
+              <a:schemeClr val="accent1"/>
+            </a:effectRef>
+            <a:fontRef idx="minor">
+              <a:schemeClr val="dk1"/>
+            </a:fontRef>
+          </p:style>
+          <p:txBody>
+            <a:bodyPr rtlCol="0" anchor="ctr"/>
+            <a:lstStyle/>
+            <a:p>
+              <a:pPr algn="ctr"/>
+              <a:endParaRPr lang="en-US"/>
+            </a:p>
+          </p:txBody>
+        </p:sp>
+        <p:sp>
+          <p:nvSpPr>
+            <p:cNvPr id="57" name="TextBox 56">
+              <a:extLst>
+                <a:ext uri="{FF2B5EF4-FFF2-40B4-BE49-F238E27FC236}">
+                  <a16:creationId xmlns:a16="http://schemas.microsoft.com/office/drawing/2014/main" id="{211209C8-1E51-43F9-BB48-86667DDAAD4C}"/>
+                </a:ext>
+              </a:extLst>
+            </p:cNvPr>
+            <p:cNvSpPr txBox="1"/>
+            <p:nvPr/>
+          </p:nvSpPr>
+          <p:spPr>
+            <a:xfrm>
+              <a:off x="1629575" y="3145913"/>
+              <a:ext cx="893450" cy="276999"/>
+            </a:xfrm>
+            <a:prstGeom prst="rect">
+              <a:avLst/>
+            </a:prstGeom>
+            <a:noFill/>
+          </p:spPr>
+          <p:txBody>
+            <a:bodyPr wrap="none" rtlCol="0">
+              <a:spAutoFit/>
+            </a:bodyPr>
+            <a:lstStyle/>
+            <a:p>
+              <a:pPr algn="ctr"/>
+              <a:r>
+                <a:rPr lang="en-US" sz="1200" dirty="0"/>
+                <a:t>Photon Pos</a:t>
+              </a:r>
+            </a:p>
+          </p:txBody>
+        </p:sp>
+        <p:sp>
+          <p:nvSpPr>
+            <p:cNvPr id="59" name="TextBox 58">
+              <a:extLst>
+                <a:ext uri="{FF2B5EF4-FFF2-40B4-BE49-F238E27FC236}">
+                  <a16:creationId xmlns:a16="http://schemas.microsoft.com/office/drawing/2014/main" id="{F5B3464B-B958-4DB2-91B5-6CC4C6138B1C}"/>
+                </a:ext>
+              </a:extLst>
+            </p:cNvPr>
+            <p:cNvSpPr txBox="1"/>
+            <p:nvPr/>
+          </p:nvSpPr>
+          <p:spPr>
+            <a:xfrm>
+              <a:off x="3400553" y="3159996"/>
+              <a:ext cx="1007135" cy="276999"/>
+            </a:xfrm>
+            <a:prstGeom prst="rect">
+              <a:avLst/>
+            </a:prstGeom>
+            <a:noFill/>
+          </p:spPr>
+          <p:txBody>
+            <a:bodyPr wrap="none" rtlCol="0">
+              <a:spAutoFit/>
+            </a:bodyPr>
+            <a:lstStyle/>
+            <a:p>
+              <a:pPr algn="ctr"/>
+              <a:r>
+                <a:rPr lang="en-US" sz="1200" dirty="0"/>
+                <a:t>Photon Color</a:t>
+              </a:r>
+            </a:p>
+          </p:txBody>
+        </p:sp>
+        <p:sp>
+          <p:nvSpPr>
+            <p:cNvPr id="60" name="TextBox 59">
+              <a:extLst>
+                <a:ext uri="{FF2B5EF4-FFF2-40B4-BE49-F238E27FC236}">
+                  <a16:creationId xmlns:a16="http://schemas.microsoft.com/office/drawing/2014/main" id="{E7C964D0-19B8-46DB-9EFA-3D71ED392832}"/>
+                </a:ext>
+              </a:extLst>
+            </p:cNvPr>
+            <p:cNvSpPr txBox="1"/>
+            <p:nvPr/>
+          </p:nvSpPr>
+          <p:spPr>
+            <a:xfrm>
+              <a:off x="1451889" y="3755901"/>
+              <a:ext cx="1148841" cy="461665"/>
+            </a:xfrm>
+            <a:prstGeom prst="rect">
+              <a:avLst/>
+            </a:prstGeom>
+            <a:noFill/>
+          </p:spPr>
+          <p:txBody>
+            <a:bodyPr wrap="none" rtlCol="0">
+              <a:spAutoFit/>
+            </a:bodyPr>
+            <a:lstStyle/>
+            <a:p>
+              <a:pPr algn="ctr"/>
+              <a:r>
+                <a:rPr lang="en-US" sz="1200" b="1" dirty="0"/>
+                <a:t>Format</a:t>
+              </a:r>
+              <a:br>
+                <a:rPr lang="en-US" sz="1200" dirty="0"/>
+              </a:br>
+              <a:r>
+                <a:rPr lang="en-US" sz="1200" dirty="0"/>
+                <a:t> RGBA FLOAT32</a:t>
+              </a:r>
+            </a:p>
+          </p:txBody>
+        </p:sp>
+        <p:sp>
+          <p:nvSpPr>
+            <p:cNvPr id="61" name="TextBox 60">
+              <a:extLst>
+                <a:ext uri="{FF2B5EF4-FFF2-40B4-BE49-F238E27FC236}">
+                  <a16:creationId xmlns:a16="http://schemas.microsoft.com/office/drawing/2014/main" id="{A4359D40-5213-4A85-98A6-78BD7F1983E9}"/>
+                </a:ext>
+              </a:extLst>
+            </p:cNvPr>
+            <p:cNvSpPr txBox="1"/>
+            <p:nvPr/>
+          </p:nvSpPr>
+          <p:spPr>
+            <a:xfrm>
+              <a:off x="3338456" y="3739510"/>
+              <a:ext cx="1148841" cy="461665"/>
+            </a:xfrm>
+            <a:prstGeom prst="rect">
+              <a:avLst/>
+            </a:prstGeom>
+            <a:noFill/>
+          </p:spPr>
+          <p:txBody>
+            <a:bodyPr wrap="none" rtlCol="0">
+              <a:spAutoFit/>
+            </a:bodyPr>
+            <a:lstStyle/>
+            <a:p>
+              <a:pPr algn="ctr"/>
+              <a:r>
+                <a:rPr lang="en-US" sz="1200" b="1" dirty="0"/>
+                <a:t>Format</a:t>
+              </a:r>
+              <a:br>
+                <a:rPr lang="en-US" sz="1200" dirty="0"/>
+              </a:br>
+              <a:r>
+                <a:rPr lang="en-US" sz="1200" dirty="0"/>
+                <a:t> RGBA FLOAT32</a:t>
+              </a:r>
+            </a:p>
+          </p:txBody>
+        </p:sp>
+        <p:sp>
+          <p:nvSpPr>
+            <p:cNvPr id="63" name="TextBox 62">
+              <a:extLst>
+                <a:ext uri="{FF2B5EF4-FFF2-40B4-BE49-F238E27FC236}">
+                  <a16:creationId xmlns:a16="http://schemas.microsoft.com/office/drawing/2014/main" id="{2A8118A5-215E-4725-83D8-532FBDCBB88A}"/>
+                </a:ext>
+              </a:extLst>
+            </p:cNvPr>
+            <p:cNvSpPr txBox="1"/>
+            <p:nvPr/>
+          </p:nvSpPr>
+          <p:spPr>
+            <a:xfrm>
+              <a:off x="1196318" y="4679519"/>
+              <a:ext cx="1808829" cy="646331"/>
+            </a:xfrm>
+            <a:prstGeom prst="rect">
+              <a:avLst/>
+            </a:prstGeom>
+            <a:noFill/>
+          </p:spPr>
+          <p:txBody>
+            <a:bodyPr wrap="none" rtlCol="0">
+              <a:spAutoFit/>
+            </a:bodyPr>
+            <a:lstStyle/>
+            <a:p>
+              <a:pPr algn="ctr"/>
+              <a:r>
+                <a:rPr lang="en-US" sz="1200" b="1" dirty="0"/>
+                <a:t>Width</a:t>
+              </a:r>
+              <a:r>
+                <a:rPr lang="en-US" sz="1200" dirty="0"/>
+                <a:t>: sqrt(numPhotons)</a:t>
+              </a:r>
+            </a:p>
+            <a:p>
+              <a:pPr algn="ctr"/>
+              <a:r>
+                <a:rPr lang="en-US" sz="1200" b="1" dirty="0"/>
+                <a:t>Height</a:t>
+              </a:r>
+              <a:r>
+                <a:rPr lang="en-US" sz="1200" dirty="0"/>
+                <a:t>: sqrt(numPhotons)</a:t>
+              </a:r>
+            </a:p>
+            <a:p>
+              <a:pPr algn="ctr"/>
+              <a:r>
+                <a:rPr lang="en-US" sz="1200" b="1" dirty="0"/>
+                <a:t>ArraySize</a:t>
+              </a:r>
+              <a:r>
+                <a:rPr lang="en-US" sz="1200" dirty="0"/>
+                <a:t>: Max Bounces</a:t>
+              </a:r>
+            </a:p>
+          </p:txBody>
+        </p:sp>
+        <p:sp>
+          <p:nvSpPr>
+            <p:cNvPr id="64" name="TextBox 63">
+              <a:extLst>
+                <a:ext uri="{FF2B5EF4-FFF2-40B4-BE49-F238E27FC236}">
+                  <a16:creationId xmlns:a16="http://schemas.microsoft.com/office/drawing/2014/main" id="{048BC624-6E3D-4908-940D-2C612DB788EC}"/>
+                </a:ext>
+              </a:extLst>
+            </p:cNvPr>
+            <p:cNvSpPr txBox="1"/>
+            <p:nvPr/>
+          </p:nvSpPr>
+          <p:spPr>
+            <a:xfrm>
+              <a:off x="3112561" y="4693120"/>
+              <a:ext cx="1808829" cy="646331"/>
+            </a:xfrm>
+            <a:prstGeom prst="rect">
+              <a:avLst/>
+            </a:prstGeom>
+            <a:noFill/>
+          </p:spPr>
+          <p:txBody>
+            <a:bodyPr wrap="none" rtlCol="0">
+              <a:spAutoFit/>
+            </a:bodyPr>
+            <a:lstStyle/>
+            <a:p>
+              <a:pPr algn="ctr"/>
+              <a:r>
+                <a:rPr lang="en-US" sz="1200" b="1" dirty="0"/>
+                <a:t>Width</a:t>
+              </a:r>
+              <a:r>
+                <a:rPr lang="en-US" sz="1200" dirty="0"/>
+                <a:t>: sqrt(numPhotons)</a:t>
+              </a:r>
+            </a:p>
+            <a:p>
+              <a:pPr algn="ctr"/>
+              <a:r>
+                <a:rPr lang="en-US" sz="1200" b="1" dirty="0"/>
+                <a:t>Height</a:t>
+              </a:r>
+              <a:r>
+                <a:rPr lang="en-US" sz="1200" dirty="0"/>
+                <a:t>: sqrt(numPhotons)</a:t>
+              </a:r>
+            </a:p>
+            <a:p>
+              <a:pPr algn="ctr"/>
+              <a:r>
+                <a:rPr lang="en-US" sz="1200" b="1" dirty="0"/>
+                <a:t>ArraySize</a:t>
+              </a:r>
+              <a:r>
+                <a:rPr lang="en-US" sz="1200" dirty="0"/>
+                <a:t>: Max Bounces</a:t>
+              </a:r>
+            </a:p>
+          </p:txBody>
+        </p:sp>
+        <p:sp>
+          <p:nvSpPr>
+            <p:cNvPr id="65" name="TextBox 64">
+              <a:extLst>
+                <a:ext uri="{FF2B5EF4-FFF2-40B4-BE49-F238E27FC236}">
+                  <a16:creationId xmlns:a16="http://schemas.microsoft.com/office/drawing/2014/main" id="{C66D00F0-413F-4A18-AD6A-678B47D32FD2}"/>
+                </a:ext>
+              </a:extLst>
+            </p:cNvPr>
+            <p:cNvSpPr txBox="1"/>
+            <p:nvPr/>
+          </p:nvSpPr>
+          <p:spPr>
+            <a:xfrm>
+              <a:off x="1401275" y="4199538"/>
+              <a:ext cx="1350050" cy="461665"/>
+            </a:xfrm>
+            <a:prstGeom prst="rect">
+              <a:avLst/>
+            </a:prstGeom>
+            <a:noFill/>
+          </p:spPr>
+          <p:txBody>
+            <a:bodyPr wrap="none" rtlCol="0">
+              <a:spAutoFit/>
+            </a:bodyPr>
+            <a:lstStyle/>
+            <a:p>
+              <a:pPr algn="ctr"/>
+              <a:r>
+                <a:rPr lang="en-US" sz="1200" b="1" dirty="0"/>
+                <a:t>RGB</a:t>
+              </a:r>
+              <a:r>
+                <a:rPr lang="en-US" sz="1200" dirty="0"/>
+                <a:t> – World Pos</a:t>
+              </a:r>
+            </a:p>
+            <a:p>
+              <a:pPr algn="ctr"/>
+              <a:r>
+                <a:rPr lang="en-US" sz="1200" b="1" dirty="0"/>
+                <a:t>A</a:t>
+              </a:r>
+              <a:r>
+                <a:rPr lang="en-US" sz="1200" dirty="0"/>
+                <a:t> – 1/0 Hit or Miss</a:t>
+              </a:r>
+            </a:p>
+          </p:txBody>
+        </p:sp>
+        <p:grpSp>
+          <p:nvGrpSpPr>
+            <p:cNvPr id="73" name="Group 72">
+              <a:extLst>
+                <a:ext uri="{FF2B5EF4-FFF2-40B4-BE49-F238E27FC236}">
+                  <a16:creationId xmlns:a16="http://schemas.microsoft.com/office/drawing/2014/main" id="{276074B3-F7CE-4D03-A79F-56EC06DA1152}"/>
+                </a:ext>
+              </a:extLst>
+            </p:cNvPr>
+            <p:cNvGrpSpPr/>
+            <p:nvPr/>
+          </p:nvGrpSpPr>
+          <p:grpSpPr>
+            <a:xfrm>
+              <a:off x="4543224" y="952556"/>
+              <a:ext cx="4367866" cy="1602747"/>
+              <a:chOff x="4778013" y="978747"/>
+              <a:chExt cx="4206190" cy="1602747"/>
+            </a:xfrm>
+          </p:grpSpPr>
+          <p:sp>
+            <p:nvSpPr>
+              <p:cNvPr id="28" name="Rectangle 27">
+                <a:extLst>
+                  <a:ext uri="{FF2B5EF4-FFF2-40B4-BE49-F238E27FC236}">
+                    <a16:creationId xmlns:a16="http://schemas.microsoft.com/office/drawing/2014/main" id="{F24B26A3-F7D3-4473-877F-672EA0E35144}"/>
+                  </a:ext>
+                </a:extLst>
+              </p:cNvPr>
+              <p:cNvSpPr/>
+              <p:nvPr/>
+            </p:nvSpPr>
+            <p:spPr>
+              <a:xfrm>
+                <a:off x="4778013" y="978747"/>
+                <a:ext cx="4206190" cy="1602747"/>
+              </a:xfrm>
+              <a:prstGeom prst="rect">
+                <a:avLst/>
+              </a:prstGeom>
+            </p:spPr>
+            <p:style>
+              <a:lnRef idx="2">
+                <a:schemeClr val="accent2">
+                  <a:shade val="50000"/>
+                </a:schemeClr>
+              </a:lnRef>
+              <a:fillRef idx="1">
+                <a:schemeClr val="accent2"/>
+              </a:fillRef>
+              <a:effectRef idx="0">
+                <a:schemeClr val="accent2"/>
+              </a:effectRef>
+              <a:fontRef idx="minor">
+                <a:schemeClr val="lt1"/>
+              </a:fontRef>
+            </p:style>
+            <p:txBody>
+              <a:bodyPr rtlCol="0" anchor="ctr"/>
+              <a:lstStyle/>
+              <a:p>
+                <a:pPr algn="ctr"/>
+                <a:endParaRPr lang="en-US" dirty="0"/>
+              </a:p>
+            </p:txBody>
+          </p:sp>
+          <p:sp>
+            <p:nvSpPr>
+              <p:cNvPr id="66" name="Rectangle 65">
+                <a:extLst>
+                  <a:ext uri="{FF2B5EF4-FFF2-40B4-BE49-F238E27FC236}">
+                    <a16:creationId xmlns:a16="http://schemas.microsoft.com/office/drawing/2014/main" id="{5F8F1801-A5C7-4D47-96AC-7510CEBEAA75}"/>
+                  </a:ext>
+                </a:extLst>
+              </p:cNvPr>
+              <p:cNvSpPr/>
+              <p:nvPr/>
+            </p:nvSpPr>
+            <p:spPr>
+              <a:xfrm>
+                <a:off x="4923429" y="1055385"/>
+                <a:ext cx="1913857" cy="703931"/>
+              </a:xfrm>
+              <a:prstGeom prst="rect">
+                <a:avLst/>
+              </a:prstGeom>
+            </p:spPr>
+            <p:style>
+              <a:lnRef idx="1">
+                <a:schemeClr val="accent2"/>
+              </a:lnRef>
+              <a:fillRef idx="2">
+                <a:schemeClr val="accent2"/>
+              </a:fillRef>
+              <a:effectRef idx="1">
+                <a:schemeClr val="accent2"/>
+              </a:effectRef>
+              <a:fontRef idx="minor">
+                <a:schemeClr val="dk1"/>
+              </a:fontRef>
+            </p:style>
+            <p:txBody>
+              <a:bodyPr rtlCol="0" anchor="ctr"/>
+              <a:lstStyle/>
+              <a:p>
+                <a:pPr algn="ctr"/>
+                <a:r>
+                  <a:rPr lang="en-US" dirty="0"/>
+                  <a:t>AccelerationStruct</a:t>
+                </a:r>
+              </a:p>
+            </p:txBody>
+          </p:sp>
+          <p:sp>
+            <p:nvSpPr>
+              <p:cNvPr id="67" name="Rectangle 66">
+                <a:extLst>
+                  <a:ext uri="{FF2B5EF4-FFF2-40B4-BE49-F238E27FC236}">
+                    <a16:creationId xmlns:a16="http://schemas.microsoft.com/office/drawing/2014/main" id="{E455CB18-F4F1-488D-B4E6-0BCE8390D09A}"/>
+                  </a:ext>
+                </a:extLst>
+              </p:cNvPr>
+              <p:cNvSpPr/>
+              <p:nvPr/>
+            </p:nvSpPr>
+            <p:spPr>
+              <a:xfrm>
+                <a:off x="4923429" y="1808935"/>
+                <a:ext cx="1913857" cy="703931"/>
+              </a:xfrm>
+              <a:prstGeom prst="rect">
+                <a:avLst/>
+              </a:prstGeom>
+            </p:spPr>
+            <p:style>
+              <a:lnRef idx="1">
+                <a:schemeClr val="accent2"/>
+              </a:lnRef>
+              <a:fillRef idx="2">
+                <a:schemeClr val="accent2"/>
+              </a:fillRef>
+              <a:effectRef idx="1">
+                <a:schemeClr val="accent2"/>
+              </a:effectRef>
+              <a:fontRef idx="minor">
+                <a:schemeClr val="dk1"/>
+              </a:fontRef>
+            </p:style>
+            <p:txBody>
+              <a:bodyPr rtlCol="0" anchor="ctr"/>
+              <a:lstStyle/>
+              <a:p>
+                <a:pPr algn="ctr"/>
+                <a:r>
+                  <a:rPr lang="en-US" dirty="0"/>
+                  <a:t>Textures</a:t>
+                </a:r>
+              </a:p>
+            </p:txBody>
+          </p:sp>
+          <p:sp>
+            <p:nvSpPr>
+              <p:cNvPr id="68" name="Rectangle 67">
+                <a:extLst>
+                  <a:ext uri="{FF2B5EF4-FFF2-40B4-BE49-F238E27FC236}">
+                    <a16:creationId xmlns:a16="http://schemas.microsoft.com/office/drawing/2014/main" id="{2066F91A-17CB-4E39-9ED5-29D062058367}"/>
+                  </a:ext>
+                </a:extLst>
+              </p:cNvPr>
+              <p:cNvSpPr/>
+              <p:nvPr/>
+            </p:nvSpPr>
+            <p:spPr>
+              <a:xfrm>
+                <a:off x="6963837" y="1828619"/>
+                <a:ext cx="1913857" cy="703931"/>
+              </a:xfrm>
+              <a:prstGeom prst="rect">
+                <a:avLst/>
+              </a:prstGeom>
+            </p:spPr>
+            <p:style>
+              <a:lnRef idx="1">
+                <a:schemeClr val="accent2"/>
+              </a:lnRef>
+              <a:fillRef idx="2">
+                <a:schemeClr val="accent2"/>
+              </a:fillRef>
+              <a:effectRef idx="1">
+                <a:schemeClr val="accent2"/>
+              </a:effectRef>
+              <a:fontRef idx="minor">
+                <a:schemeClr val="dk1"/>
+              </a:fontRef>
+            </p:style>
+            <p:txBody>
+              <a:bodyPr rtlCol="0" anchor="ctr"/>
+              <a:lstStyle/>
+              <a:p>
+                <a:pPr algn="ctr"/>
+                <a:r>
+                  <a:rPr lang="en-US" dirty="0"/>
+                  <a:t>Indices</a:t>
+                </a:r>
+              </a:p>
+            </p:txBody>
+          </p:sp>
+          <p:sp>
+            <p:nvSpPr>
+              <p:cNvPr id="69" name="Rectangle 68">
+                <a:extLst>
+                  <a:ext uri="{FF2B5EF4-FFF2-40B4-BE49-F238E27FC236}">
+                    <a16:creationId xmlns:a16="http://schemas.microsoft.com/office/drawing/2014/main" id="{34707975-E7D3-4F3E-944A-6411788F2AEA}"/>
+                  </a:ext>
+                </a:extLst>
+              </p:cNvPr>
+              <p:cNvSpPr/>
+              <p:nvPr/>
+            </p:nvSpPr>
+            <p:spPr>
+              <a:xfrm>
+                <a:off x="6962604" y="1075454"/>
+                <a:ext cx="1913857" cy="703931"/>
+              </a:xfrm>
+              <a:prstGeom prst="rect">
+                <a:avLst/>
+              </a:prstGeom>
+            </p:spPr>
+            <p:style>
+              <a:lnRef idx="1">
+                <a:schemeClr val="accent2"/>
+              </a:lnRef>
+              <a:fillRef idx="2">
+                <a:schemeClr val="accent2"/>
+              </a:fillRef>
+              <a:effectRef idx="1">
+                <a:schemeClr val="accent2"/>
+              </a:effectRef>
+              <a:fontRef idx="minor">
+                <a:schemeClr val="dk1"/>
+              </a:fontRef>
+            </p:style>
+            <p:txBody>
+              <a:bodyPr rtlCol="0" anchor="ctr"/>
+              <a:lstStyle/>
+              <a:p>
+                <a:pPr algn="ctr"/>
+                <a:r>
+                  <a:rPr lang="en-US" dirty="0"/>
+                  <a:t>Vertices</a:t>
+                </a:r>
+              </a:p>
+            </p:txBody>
+          </p:sp>
+        </p:grpSp>
+        <p:sp>
+          <p:nvSpPr>
+            <p:cNvPr id="74" name="Rectangle 73">
+              <a:extLst>
+                <a:ext uri="{FF2B5EF4-FFF2-40B4-BE49-F238E27FC236}">
+                  <a16:creationId xmlns:a16="http://schemas.microsoft.com/office/drawing/2014/main" id="{0D539D67-DA45-42DD-8B95-E0856EC2D6B6}"/>
+                </a:ext>
+              </a:extLst>
+            </p:cNvPr>
+            <p:cNvSpPr/>
+            <p:nvPr/>
+          </p:nvSpPr>
+          <p:spPr>
+            <a:xfrm>
+              <a:off x="7053482" y="2796540"/>
+              <a:ext cx="1857608" cy="2748485"/>
+            </a:xfrm>
+            <a:prstGeom prst="rect">
+              <a:avLst/>
+            </a:prstGeom>
+          </p:spPr>
+          <p:style>
+            <a:lnRef idx="2">
+              <a:schemeClr val="accent4">
+                <a:shade val="50000"/>
+              </a:schemeClr>
+            </a:lnRef>
+            <a:fillRef idx="1">
+              <a:schemeClr val="accent4"/>
+            </a:fillRef>
+            <a:effectRef idx="0">
+              <a:schemeClr val="accent4"/>
+            </a:effectRef>
+            <a:fontRef idx="minor">
+              <a:schemeClr val="lt1"/>
+            </a:fontRef>
+          </p:style>
+          <p:txBody>
+            <a:bodyPr rtlCol="0" anchor="ctr"/>
+            <a:lstStyle/>
+            <a:p>
+              <a:pPr algn="ctr"/>
+              <a:endParaRPr lang="en-US" dirty="0"/>
+            </a:p>
+          </p:txBody>
+        </p:sp>
+        <p:sp>
+          <p:nvSpPr>
+            <p:cNvPr id="76" name="Rectangle 75">
+              <a:extLst>
+                <a:ext uri="{FF2B5EF4-FFF2-40B4-BE49-F238E27FC236}">
+                  <a16:creationId xmlns:a16="http://schemas.microsoft.com/office/drawing/2014/main" id="{179598C1-DCED-44D2-9F11-A68D8D0F1759}"/>
+                </a:ext>
+              </a:extLst>
+            </p:cNvPr>
+            <p:cNvSpPr/>
+            <p:nvPr/>
+          </p:nvSpPr>
+          <p:spPr>
+            <a:xfrm>
+              <a:off x="9292063" y="3811741"/>
+              <a:ext cx="301841" cy="248575"/>
+            </a:xfrm>
+            <a:prstGeom prst="rect">
+              <a:avLst/>
+            </a:prstGeom>
+          </p:spPr>
+          <p:style>
+            <a:lnRef idx="2">
+              <a:schemeClr val="accent4">
+                <a:shade val="50000"/>
+              </a:schemeClr>
+            </a:lnRef>
+            <a:fillRef idx="1">
+              <a:schemeClr val="accent4"/>
+            </a:fillRef>
+            <a:effectRef idx="0">
+              <a:schemeClr val="accent4"/>
+            </a:effectRef>
+            <a:fontRef idx="minor">
+              <a:schemeClr val="lt1"/>
+            </a:fontRef>
+          </p:style>
+          <p:txBody>
+            <a:bodyPr rtlCol="0" anchor="ctr"/>
+            <a:lstStyle/>
+            <a:p>
+              <a:pPr algn="ctr"/>
+              <a:endParaRPr lang="en-US"/>
+            </a:p>
+          </p:txBody>
+        </p:sp>
+        <p:sp>
+          <p:nvSpPr>
+            <p:cNvPr id="77" name="TextBox 76">
+              <a:extLst>
+                <a:ext uri="{FF2B5EF4-FFF2-40B4-BE49-F238E27FC236}">
+                  <a16:creationId xmlns:a16="http://schemas.microsoft.com/office/drawing/2014/main" id="{03187978-4A88-4004-8519-E01F151815D1}"/>
+                </a:ext>
+              </a:extLst>
+            </p:cNvPr>
+            <p:cNvSpPr txBox="1"/>
+            <p:nvPr/>
+          </p:nvSpPr>
+          <p:spPr>
+            <a:xfrm>
+              <a:off x="9629423" y="3809976"/>
+              <a:ext cx="930576" cy="276999"/>
+            </a:xfrm>
+            <a:prstGeom prst="rect">
+              <a:avLst/>
+            </a:prstGeom>
+            <a:noFill/>
+          </p:spPr>
+          <p:txBody>
+            <a:bodyPr wrap="none" rtlCol="0">
+              <a:spAutoFit/>
+            </a:bodyPr>
+            <a:lstStyle/>
+            <a:p>
+              <a:r>
+                <a:rPr lang="en-US" sz="1200" dirty="0"/>
+                <a:t>Ray Payload</a:t>
+              </a:r>
+            </a:p>
+          </p:txBody>
+        </p:sp>
+        <p:sp>
+          <p:nvSpPr>
+            <p:cNvPr id="78" name="Rectangle 77">
+              <a:extLst>
+                <a:ext uri="{FF2B5EF4-FFF2-40B4-BE49-F238E27FC236}">
+                  <a16:creationId xmlns:a16="http://schemas.microsoft.com/office/drawing/2014/main" id="{17A0D647-432F-4418-9AFB-F2A1ACDEDA28}"/>
+                </a:ext>
+              </a:extLst>
+            </p:cNvPr>
+            <p:cNvSpPr/>
+            <p:nvPr/>
+          </p:nvSpPr>
+          <p:spPr>
+            <a:xfrm>
+              <a:off x="5200107" y="2893139"/>
+              <a:ext cx="1574657" cy="427193"/>
+            </a:xfrm>
+            <a:prstGeom prst="rect">
+              <a:avLst/>
+            </a:prstGeom>
+          </p:spPr>
+          <p:style>
+            <a:lnRef idx="1">
+              <a:schemeClr val="accent6"/>
+            </a:lnRef>
+            <a:fillRef idx="2">
+              <a:schemeClr val="accent6"/>
+            </a:fillRef>
+            <a:effectRef idx="1">
+              <a:schemeClr val="accent6"/>
+            </a:effectRef>
+            <a:fontRef idx="minor">
+              <a:schemeClr val="dk1"/>
+            </a:fontRef>
+          </p:style>
+          <p:txBody>
+            <a:bodyPr rtlCol="0" anchor="ctr"/>
+            <a:lstStyle/>
+            <a:p>
+              <a:pPr algn="ctr"/>
+              <a:r>
+                <a:rPr lang="en-US" sz="1400" dirty="0"/>
+                <a:t>mat4 ViewProj</a:t>
+              </a:r>
+            </a:p>
+          </p:txBody>
+        </p:sp>
+        <p:sp>
+          <p:nvSpPr>
+            <p:cNvPr id="81" name="Rectangle 80">
+              <a:extLst>
+                <a:ext uri="{FF2B5EF4-FFF2-40B4-BE49-F238E27FC236}">
+                  <a16:creationId xmlns:a16="http://schemas.microsoft.com/office/drawing/2014/main" id="{3725B44E-CDC5-4ED0-9ACB-8A98FCCF1C0C}"/>
+                </a:ext>
+              </a:extLst>
+            </p:cNvPr>
+            <p:cNvSpPr/>
+            <p:nvPr/>
+          </p:nvSpPr>
+          <p:spPr>
+            <a:xfrm>
+              <a:off x="5200106" y="3422912"/>
+              <a:ext cx="1574657" cy="427193"/>
+            </a:xfrm>
+            <a:prstGeom prst="rect">
+              <a:avLst/>
+            </a:prstGeom>
+          </p:spPr>
+          <p:style>
+            <a:lnRef idx="1">
+              <a:schemeClr val="accent6"/>
+            </a:lnRef>
+            <a:fillRef idx="2">
+              <a:schemeClr val="accent6"/>
+            </a:fillRef>
+            <a:effectRef idx="1">
+              <a:schemeClr val="accent6"/>
+            </a:effectRef>
+            <a:fontRef idx="minor">
+              <a:schemeClr val="dk1"/>
+            </a:fontRef>
+          </p:style>
+          <p:txBody>
+            <a:bodyPr rtlCol="0" anchor="ctr"/>
+            <a:lstStyle/>
+            <a:p>
+              <a:pPr algn="ctr"/>
+              <a:r>
+                <a:rPr lang="en-US" sz="1400" dirty="0"/>
+                <a:t>mat4 InvViewProj</a:t>
+              </a:r>
+            </a:p>
+          </p:txBody>
+        </p:sp>
+        <p:sp>
+          <p:nvSpPr>
+            <p:cNvPr id="82" name="Rectangle 81">
+              <a:extLst>
+                <a:ext uri="{FF2B5EF4-FFF2-40B4-BE49-F238E27FC236}">
+                  <a16:creationId xmlns:a16="http://schemas.microsoft.com/office/drawing/2014/main" id="{71D02216-F08D-47AF-9A5D-5E6C56B8C853}"/>
+                </a:ext>
+              </a:extLst>
+            </p:cNvPr>
+            <p:cNvSpPr/>
+            <p:nvPr/>
+          </p:nvSpPr>
+          <p:spPr>
+            <a:xfrm>
+              <a:off x="5200105" y="3965253"/>
+              <a:ext cx="1574657" cy="427193"/>
+            </a:xfrm>
+            <a:prstGeom prst="rect">
+              <a:avLst/>
+            </a:prstGeom>
+          </p:spPr>
+          <p:style>
+            <a:lnRef idx="1">
+              <a:schemeClr val="accent6"/>
+            </a:lnRef>
+            <a:fillRef idx="2">
+              <a:schemeClr val="accent6"/>
+            </a:fillRef>
+            <a:effectRef idx="1">
+              <a:schemeClr val="accent6"/>
+            </a:effectRef>
+            <a:fontRef idx="minor">
+              <a:schemeClr val="dk1"/>
+            </a:fontRef>
+          </p:style>
+          <p:txBody>
+            <a:bodyPr rtlCol="0" anchor="ctr"/>
+            <a:lstStyle/>
+            <a:p>
+              <a:pPr algn="ctr"/>
+              <a:r>
+                <a:rPr lang="en-US" sz="1400" dirty="0"/>
+                <a:t>vec4 CameraPos</a:t>
+              </a:r>
+            </a:p>
+          </p:txBody>
+        </p:sp>
+        <p:sp>
+          <p:nvSpPr>
+            <p:cNvPr id="83" name="Rectangle 82">
+              <a:extLst>
+                <a:ext uri="{FF2B5EF4-FFF2-40B4-BE49-F238E27FC236}">
+                  <a16:creationId xmlns:a16="http://schemas.microsoft.com/office/drawing/2014/main" id="{6D76E4EF-7C2E-4EBC-BDE2-DDBE78AA2802}"/>
+                </a:ext>
+              </a:extLst>
+            </p:cNvPr>
+            <p:cNvSpPr/>
+            <p:nvPr/>
+          </p:nvSpPr>
+          <p:spPr>
+            <a:xfrm>
+              <a:off x="5200105" y="4501928"/>
+              <a:ext cx="1574657" cy="427193"/>
+            </a:xfrm>
+            <a:prstGeom prst="rect">
+              <a:avLst/>
+            </a:prstGeom>
+          </p:spPr>
+          <p:style>
+            <a:lnRef idx="1">
+              <a:schemeClr val="accent6"/>
+            </a:lnRef>
+            <a:fillRef idx="2">
+              <a:schemeClr val="accent6"/>
+            </a:fillRef>
+            <a:effectRef idx="1">
+              <a:schemeClr val="accent6"/>
+            </a:effectRef>
+            <a:fontRef idx="minor">
+              <a:schemeClr val="dk1"/>
+            </a:fontRef>
+          </p:style>
+          <p:txBody>
+            <a:bodyPr rtlCol="0" anchor="ctr"/>
+            <a:lstStyle/>
+            <a:p>
+              <a:pPr algn="ctr"/>
+              <a:r>
+                <a:rPr lang="en-US" sz="1400" dirty="0"/>
+                <a:t>vec4 LightPos</a:t>
+              </a:r>
+            </a:p>
+          </p:txBody>
+        </p:sp>
+        <p:sp>
+          <p:nvSpPr>
+            <p:cNvPr id="84" name="Rectangle 83">
+              <a:extLst>
+                <a:ext uri="{FF2B5EF4-FFF2-40B4-BE49-F238E27FC236}">
+                  <a16:creationId xmlns:a16="http://schemas.microsoft.com/office/drawing/2014/main" id="{AE7B81D4-C7C5-41ED-9F38-40B83743C6FA}"/>
+                </a:ext>
+              </a:extLst>
+            </p:cNvPr>
+            <p:cNvSpPr/>
+            <p:nvPr/>
+          </p:nvSpPr>
+          <p:spPr>
+            <a:xfrm>
+              <a:off x="5200104" y="5010750"/>
+              <a:ext cx="1574657" cy="427193"/>
+            </a:xfrm>
+            <a:prstGeom prst="rect">
+              <a:avLst/>
+            </a:prstGeom>
+          </p:spPr>
+          <p:style>
+            <a:lnRef idx="1">
+              <a:schemeClr val="accent6"/>
+            </a:lnRef>
+            <a:fillRef idx="2">
+              <a:schemeClr val="accent6"/>
+            </a:fillRef>
+            <a:effectRef idx="1">
+              <a:schemeClr val="accent6"/>
+            </a:effectRef>
+            <a:fontRef idx="minor">
+              <a:schemeClr val="dk1"/>
+            </a:fontRef>
+          </p:style>
+          <p:txBody>
+            <a:bodyPr rtlCol="0" anchor="ctr"/>
+            <a:lstStyle/>
+            <a:p>
+              <a:pPr algn="ctr"/>
+              <a:r>
+                <a:rPr lang="en-US" sz="1400" dirty="0"/>
+                <a:t>vec4 AmbientLight</a:t>
+              </a:r>
+            </a:p>
+          </p:txBody>
+        </p:sp>
+        <p:sp>
+          <p:nvSpPr>
+            <p:cNvPr id="85" name="Rectangle 84">
+              <a:extLst>
+                <a:ext uri="{FF2B5EF4-FFF2-40B4-BE49-F238E27FC236}">
+                  <a16:creationId xmlns:a16="http://schemas.microsoft.com/office/drawing/2014/main" id="{76F74D15-A5ED-4286-BA46-C95FAF030C3A}"/>
+                </a:ext>
+              </a:extLst>
+            </p:cNvPr>
+            <p:cNvSpPr/>
+            <p:nvPr/>
+          </p:nvSpPr>
+          <p:spPr>
+            <a:xfrm>
+              <a:off x="7200898" y="2905235"/>
+              <a:ext cx="1574657" cy="427193"/>
+            </a:xfrm>
+            <a:prstGeom prst="rect">
+              <a:avLst/>
+            </a:prstGeom>
+          </p:spPr>
+          <p:style>
+            <a:lnRef idx="1">
+              <a:schemeClr val="accent4"/>
+            </a:lnRef>
+            <a:fillRef idx="2">
+              <a:schemeClr val="accent4"/>
+            </a:fillRef>
+            <a:effectRef idx="1">
+              <a:schemeClr val="accent4"/>
+            </a:effectRef>
+            <a:fontRef idx="minor">
+              <a:schemeClr val="dk1"/>
+            </a:fontRef>
+          </p:style>
+          <p:txBody>
+            <a:bodyPr rtlCol="0" anchor="ctr"/>
+            <a:lstStyle/>
+            <a:p>
+              <a:pPr algn="ctr"/>
+              <a:r>
+                <a:rPr lang="en-US" sz="1400" dirty="0"/>
+                <a:t>vec4 color</a:t>
+              </a:r>
+            </a:p>
+          </p:txBody>
+        </p:sp>
+        <p:sp>
+          <p:nvSpPr>
+            <p:cNvPr id="86" name="Rectangle 85">
+              <a:extLst>
+                <a:ext uri="{FF2B5EF4-FFF2-40B4-BE49-F238E27FC236}">
+                  <a16:creationId xmlns:a16="http://schemas.microsoft.com/office/drawing/2014/main" id="{994F27E1-13FB-4F5D-8ABA-294322C1268B}"/>
+                </a:ext>
+              </a:extLst>
+            </p:cNvPr>
+            <p:cNvSpPr/>
+            <p:nvPr/>
+          </p:nvSpPr>
+          <p:spPr>
+            <a:xfrm>
+              <a:off x="7200897" y="3435008"/>
+              <a:ext cx="1574657" cy="427193"/>
+            </a:xfrm>
+            <a:prstGeom prst="rect">
+              <a:avLst/>
+            </a:prstGeom>
+          </p:spPr>
+          <p:style>
+            <a:lnRef idx="1">
+              <a:schemeClr val="accent4"/>
+            </a:lnRef>
+            <a:fillRef idx="2">
+              <a:schemeClr val="accent4"/>
+            </a:fillRef>
+            <a:effectRef idx="1">
+              <a:schemeClr val="accent4"/>
+            </a:effectRef>
+            <a:fontRef idx="minor">
+              <a:schemeClr val="dk1"/>
+            </a:fontRef>
+          </p:style>
+          <p:txBody>
+            <a:bodyPr rtlCol="0" anchor="ctr"/>
+            <a:lstStyle/>
+            <a:p>
+              <a:pPr algn="ctr"/>
+              <a:r>
+                <a:rPr lang="en-US" sz="1400" dirty="0"/>
+                <a:t>vec4 position</a:t>
+              </a:r>
+            </a:p>
+          </p:txBody>
+        </p:sp>
+        <p:sp>
+          <p:nvSpPr>
+            <p:cNvPr id="87" name="Rectangle 86">
+              <a:extLst>
+                <a:ext uri="{FF2B5EF4-FFF2-40B4-BE49-F238E27FC236}">
+                  <a16:creationId xmlns:a16="http://schemas.microsoft.com/office/drawing/2014/main" id="{41281C0B-671A-4138-9178-0D3A19BAFFC7}"/>
+                </a:ext>
+              </a:extLst>
+            </p:cNvPr>
+            <p:cNvSpPr/>
+            <p:nvPr/>
+          </p:nvSpPr>
+          <p:spPr>
+            <a:xfrm>
+              <a:off x="7200896" y="3977349"/>
+              <a:ext cx="1574657" cy="427193"/>
+            </a:xfrm>
+            <a:prstGeom prst="rect">
+              <a:avLst/>
+            </a:prstGeom>
+          </p:spPr>
+          <p:style>
+            <a:lnRef idx="1">
+              <a:schemeClr val="accent4"/>
+            </a:lnRef>
+            <a:fillRef idx="2">
+              <a:schemeClr val="accent4"/>
+            </a:fillRef>
+            <a:effectRef idx="1">
+              <a:schemeClr val="accent4"/>
+            </a:effectRef>
+            <a:fontRef idx="minor">
+              <a:schemeClr val="dk1"/>
+            </a:fontRef>
+          </p:style>
+          <p:txBody>
+            <a:bodyPr rtlCol="0" anchor="ctr"/>
+            <a:lstStyle/>
+            <a:p>
+              <a:pPr algn="ctr"/>
+              <a:r>
+                <a:rPr lang="en-US" sz="1400" dirty="0"/>
+                <a:t>vec4 throughput</a:t>
+              </a:r>
+            </a:p>
+          </p:txBody>
+        </p:sp>
+        <p:sp>
+          <p:nvSpPr>
+            <p:cNvPr id="88" name="Rectangle 87">
+              <a:extLst>
+                <a:ext uri="{FF2B5EF4-FFF2-40B4-BE49-F238E27FC236}">
+                  <a16:creationId xmlns:a16="http://schemas.microsoft.com/office/drawing/2014/main" id="{96E39CB8-8B56-421B-8153-A4C18F8C5DA2}"/>
+                </a:ext>
+              </a:extLst>
+            </p:cNvPr>
+            <p:cNvSpPr/>
+            <p:nvPr/>
+          </p:nvSpPr>
+          <p:spPr>
+            <a:xfrm>
+              <a:off x="7200896" y="4514024"/>
+              <a:ext cx="1574657" cy="427193"/>
+            </a:xfrm>
+            <a:prstGeom prst="rect">
+              <a:avLst/>
+            </a:prstGeom>
+          </p:spPr>
+          <p:style>
+            <a:lnRef idx="1">
+              <a:schemeClr val="accent4"/>
+            </a:lnRef>
+            <a:fillRef idx="2">
+              <a:schemeClr val="accent4"/>
+            </a:fillRef>
+            <a:effectRef idx="1">
+              <a:schemeClr val="accent4"/>
+            </a:effectRef>
+            <a:fontRef idx="minor">
+              <a:schemeClr val="dk1"/>
+            </a:fontRef>
+          </p:style>
+          <p:txBody>
+            <a:bodyPr rtlCol="0" anchor="ctr"/>
+            <a:lstStyle/>
+            <a:p>
+              <a:pPr algn="ctr"/>
+              <a:r>
+                <a:rPr lang="en-US" sz="1400" dirty="0"/>
+                <a:t>vec4 nextDirection</a:t>
+              </a:r>
+            </a:p>
+          </p:txBody>
+        </p:sp>
+        <p:sp>
+          <p:nvSpPr>
+            <p:cNvPr id="89" name="Rectangle 88">
+              <a:extLst>
+                <a:ext uri="{FF2B5EF4-FFF2-40B4-BE49-F238E27FC236}">
+                  <a16:creationId xmlns:a16="http://schemas.microsoft.com/office/drawing/2014/main" id="{69C73245-DB98-4D36-A5DA-F7E90E449D7C}"/>
+                </a:ext>
+              </a:extLst>
+            </p:cNvPr>
+            <p:cNvSpPr/>
+            <p:nvPr/>
+          </p:nvSpPr>
+          <p:spPr>
+            <a:xfrm>
+              <a:off x="7200895" y="5022846"/>
+              <a:ext cx="1574657" cy="427193"/>
+            </a:xfrm>
+            <a:prstGeom prst="rect">
+              <a:avLst/>
+            </a:prstGeom>
+          </p:spPr>
+          <p:style>
+            <a:lnRef idx="1">
+              <a:schemeClr val="accent4"/>
+            </a:lnRef>
+            <a:fillRef idx="2">
+              <a:schemeClr val="accent4"/>
+            </a:fillRef>
+            <a:effectRef idx="1">
+              <a:schemeClr val="accent4"/>
+            </a:effectRef>
+            <a:fontRef idx="minor">
+              <a:schemeClr val="dk1"/>
+            </a:fontRef>
+          </p:style>
+          <p:txBody>
+            <a:bodyPr rtlCol="0" anchor="ctr"/>
+            <a:lstStyle/>
+            <a:p>
+              <a:pPr algn="ctr"/>
+              <a:r>
+                <a:rPr lang="en-US" sz="1400" dirty="0"/>
+                <a:t>vec4 info bundle</a:t>
+              </a:r>
+            </a:p>
+          </p:txBody>
+        </p:sp>
+        <p:sp>
+          <p:nvSpPr>
+            <p:cNvPr id="90" name="TextBox 89">
+              <a:extLst>
+                <a:ext uri="{FF2B5EF4-FFF2-40B4-BE49-F238E27FC236}">
+                  <a16:creationId xmlns:a16="http://schemas.microsoft.com/office/drawing/2014/main" id="{2954FDB8-483D-4114-8F1D-C0A753CC4A25}"/>
+                </a:ext>
+              </a:extLst>
+            </p:cNvPr>
+            <p:cNvSpPr txBox="1"/>
+            <p:nvPr/>
+          </p:nvSpPr>
+          <p:spPr>
+            <a:xfrm>
+              <a:off x="2523025" y="373749"/>
+              <a:ext cx="4335610" cy="369332"/>
+            </a:xfrm>
+            <a:prstGeom prst="rect">
+              <a:avLst/>
+            </a:prstGeom>
+            <a:noFill/>
+          </p:spPr>
+          <p:txBody>
+            <a:bodyPr wrap="none" rtlCol="0">
+              <a:spAutoFit/>
+            </a:bodyPr>
+            <a:lstStyle/>
+            <a:p>
+              <a:r>
+                <a:rPr lang="en-US" b="1" dirty="0">
+                  <a:solidFill>
+                    <a:schemeClr val="bg1"/>
+                  </a:solidFill>
+                </a:rPr>
+                <a:t>DXR Based Photon Mapper Memory Layout</a:t>
+              </a:r>
+            </a:p>
+          </p:txBody>
+        </p:sp>
+        <p:sp>
+          <p:nvSpPr>
+            <p:cNvPr id="91" name="TextBox 90">
+              <a:extLst>
+                <a:ext uri="{FF2B5EF4-FFF2-40B4-BE49-F238E27FC236}">
+                  <a16:creationId xmlns:a16="http://schemas.microsoft.com/office/drawing/2014/main" id="{2A7F692A-01D3-4001-85FF-16231514BFC3}"/>
+                </a:ext>
+              </a:extLst>
+            </p:cNvPr>
+            <p:cNvSpPr txBox="1"/>
+            <p:nvPr/>
+          </p:nvSpPr>
+          <p:spPr>
+            <a:xfrm>
+              <a:off x="9608271" y="1632962"/>
+              <a:ext cx="1261499" cy="369332"/>
+            </a:xfrm>
+            <a:prstGeom prst="rect">
+              <a:avLst/>
+            </a:prstGeom>
+            <a:noFill/>
+          </p:spPr>
+          <p:txBody>
+            <a:bodyPr wrap="none" rtlCol="0">
+              <a:spAutoFit/>
+            </a:bodyPr>
+            <a:lstStyle/>
+            <a:p>
+              <a:r>
+                <a:rPr lang="en-US" b="1" dirty="0"/>
+                <a:t>View Types</a:t>
+              </a:r>
+            </a:p>
+          </p:txBody>
+        </p:sp>
+      </p:grpSp>
+    </p:spTree>
+    <p:extLst>
+      <p:ext uri="{BB962C8B-B14F-4D97-AF65-F5344CB8AC3E}">
+        <p14:creationId xmlns:p14="http://schemas.microsoft.com/office/powerpoint/2010/main" val="2331682294"/>
+      </p:ext>
+    </p:extLst>
+  </p:cSld>
+  <p:clrMapOvr>
+    <a:masterClrMapping/>
+  </p:clrMapOvr>
+</p:sld>
+</file>
+
+<file path=ppt/slides/slide5.xml><?xml version="1.0" encoding="utf-8"?>
+<p:sld xmlns:a="http://schemas.openxmlformats.org/drawingml/2006/main" xmlns:r="http://schemas.openxmlformats.org/officeDocument/2006/relationships" xmlns:p="http://schemas.openxmlformats.org/presentationml/2006/main">
+  <p:cSld>
+    <p:spTree>
+      <p:nvGrpSpPr>
+        <p:cNvPr id="1" name=""/>
+        <p:cNvGrpSpPr/>
+        <p:nvPr/>
+      </p:nvGrpSpPr>
+      <p:grpSpPr>
+        <a:xfrm>
+          <a:off x="0" y="0"/>
+          <a:ext cx="0" cy="0"/>
+          <a:chOff x="0" y="0"/>
+          <a:chExt cx="0" cy="0"/>
+        </a:xfrm>
+      </p:grpSpPr>
+      <p:grpSp>
+        <p:nvGrpSpPr>
+          <p:cNvPr id="80" name="Group 79">
+            <a:extLst>
+              <a:ext uri="{FF2B5EF4-FFF2-40B4-BE49-F238E27FC236}">
+                <a16:creationId xmlns:a16="http://schemas.microsoft.com/office/drawing/2014/main" id="{3887334E-EB64-42B7-B2D0-DAD7A64F6CDE}"/>
+              </a:ext>
+            </a:extLst>
+          </p:cNvPr>
+          <p:cNvGrpSpPr/>
+          <p:nvPr/>
+        </p:nvGrpSpPr>
+        <p:grpSpPr>
+          <a:xfrm>
+            <a:off x="1207362" y="1198486"/>
+            <a:ext cx="9194278" cy="4492102"/>
+            <a:chOff x="1207362" y="1198486"/>
+            <a:chExt cx="9194278" cy="4492102"/>
+          </a:xfrm>
+        </p:grpSpPr>
+        <p:sp>
+          <p:nvSpPr>
+            <p:cNvPr id="4" name="Rectangle 3">
+              <a:extLst>
+                <a:ext uri="{FF2B5EF4-FFF2-40B4-BE49-F238E27FC236}">
+                  <a16:creationId xmlns:a16="http://schemas.microsoft.com/office/drawing/2014/main" id="{1ECD46F7-0F18-453B-ABBE-891E0835635A}"/>
+                </a:ext>
+              </a:extLst>
+            </p:cNvPr>
+            <p:cNvSpPr/>
+            <p:nvPr/>
+          </p:nvSpPr>
+          <p:spPr>
+            <a:xfrm>
+              <a:off x="1207362" y="1198486"/>
+              <a:ext cx="9194278" cy="4492102"/>
+            </a:xfrm>
+            <a:prstGeom prst="rect">
+              <a:avLst/>
+            </a:prstGeom>
+            <a:solidFill>
+              <a:schemeClr val="tx1">
+                <a:lumMod val="75000"/>
+                <a:lumOff val="25000"/>
+              </a:schemeClr>
+            </a:solidFill>
+          </p:spPr>
+          <p:style>
+            <a:lnRef idx="2">
+              <a:schemeClr val="accent3">
+                <a:shade val="50000"/>
+              </a:schemeClr>
+            </a:lnRef>
+            <a:fillRef idx="1">
+              <a:schemeClr val="accent3"/>
+            </a:fillRef>
+            <a:effectRef idx="0">
+              <a:schemeClr val="accent3"/>
+            </a:effectRef>
+            <a:fontRef idx="minor">
+              <a:schemeClr val="lt1"/>
+            </a:fontRef>
+          </p:style>
+          <p:txBody>
+            <a:bodyPr rtlCol="0" anchor="ctr"/>
+            <a:lstStyle/>
+            <a:p>
+              <a:pPr algn="ctr"/>
+              <a:endParaRPr lang="en-US" dirty="0"/>
+            </a:p>
+          </p:txBody>
+        </p:sp>
+        <p:sp>
+          <p:nvSpPr>
+            <p:cNvPr id="5" name="Rectangle 4">
+              <a:extLst>
+                <a:ext uri="{FF2B5EF4-FFF2-40B4-BE49-F238E27FC236}">
+                  <a16:creationId xmlns:a16="http://schemas.microsoft.com/office/drawing/2014/main" id="{94755375-D01E-4405-8426-23B8BA689894}"/>
+                </a:ext>
+              </a:extLst>
+            </p:cNvPr>
+            <p:cNvSpPr/>
+            <p:nvPr/>
+          </p:nvSpPr>
+          <p:spPr>
+            <a:xfrm>
+              <a:off x="2876365" y="1979722"/>
+              <a:ext cx="7261934" cy="1633490"/>
+            </a:xfrm>
+            <a:prstGeom prst="rect">
+              <a:avLst/>
+            </a:prstGeom>
+          </p:spPr>
+          <p:style>
+            <a:lnRef idx="2">
+              <a:schemeClr val="accent1">
+                <a:shade val="50000"/>
+              </a:schemeClr>
+            </a:lnRef>
+            <a:fillRef idx="1">
+              <a:schemeClr val="accent1"/>
+            </a:fillRef>
+            <a:effectRef idx="0">
+              <a:schemeClr val="accent1"/>
+            </a:effectRef>
+            <a:fontRef idx="minor">
+              <a:schemeClr val="lt1"/>
+            </a:fontRef>
+          </p:style>
+          <p:txBody>
+            <a:bodyPr rtlCol="0" anchor="ctr"/>
+            <a:lstStyle/>
+            <a:p>
+              <a:pPr algn="ctr"/>
+              <a:endParaRPr lang="en-US"/>
+            </a:p>
+          </p:txBody>
+        </p:sp>
+        <p:sp>
+          <p:nvSpPr>
+            <p:cNvPr id="6" name="Rectangle 5">
+              <a:extLst>
+                <a:ext uri="{FF2B5EF4-FFF2-40B4-BE49-F238E27FC236}">
+                  <a16:creationId xmlns:a16="http://schemas.microsoft.com/office/drawing/2014/main" id="{70730980-1700-4ACA-B22A-8BA5F35A1B6E}"/>
+                </a:ext>
+              </a:extLst>
+            </p:cNvPr>
+            <p:cNvSpPr/>
+            <p:nvPr/>
+          </p:nvSpPr>
+          <p:spPr>
+            <a:xfrm>
+              <a:off x="3112362" y="2418469"/>
+              <a:ext cx="2691415" cy="1012056"/>
+            </a:xfrm>
+            <a:prstGeom prst="rect">
+              <a:avLst/>
+            </a:prstGeom>
+          </p:spPr>
+          <p:style>
+            <a:lnRef idx="1">
+              <a:schemeClr val="accent1"/>
+            </a:lnRef>
+            <a:fillRef idx="2">
+              <a:schemeClr val="accent1"/>
+            </a:fillRef>
+            <a:effectRef idx="1">
+              <a:schemeClr val="accent1"/>
+            </a:effectRef>
+            <a:fontRef idx="minor">
+              <a:schemeClr val="dk1"/>
+            </a:fontRef>
+          </p:style>
+          <p:txBody>
+            <a:bodyPr rtlCol="0" anchor="ctr"/>
+            <a:lstStyle/>
+            <a:p>
+              <a:pPr algn="ctr"/>
+              <a:endParaRPr lang="en-US" dirty="0"/>
+            </a:p>
+          </p:txBody>
+        </p:sp>
+        <p:sp>
+          <p:nvSpPr>
+            <p:cNvPr id="7" name="Rectangle 6">
+              <a:extLst>
+                <a:ext uri="{FF2B5EF4-FFF2-40B4-BE49-F238E27FC236}">
+                  <a16:creationId xmlns:a16="http://schemas.microsoft.com/office/drawing/2014/main" id="{82A5F7BA-FC39-45F6-AEE7-A94882B49DD7}"/>
+                </a:ext>
+              </a:extLst>
+            </p:cNvPr>
+            <p:cNvSpPr/>
+            <p:nvPr/>
+          </p:nvSpPr>
+          <p:spPr>
+            <a:xfrm>
+              <a:off x="5956176" y="2418469"/>
+              <a:ext cx="4075591" cy="1012055"/>
+            </a:xfrm>
+            <a:prstGeom prst="rect">
+              <a:avLst/>
+            </a:prstGeom>
+          </p:spPr>
+          <p:style>
+            <a:lnRef idx="1">
+              <a:schemeClr val="accent1"/>
+            </a:lnRef>
+            <a:fillRef idx="2">
+              <a:schemeClr val="accent1"/>
+            </a:fillRef>
+            <a:effectRef idx="1">
+              <a:schemeClr val="accent1"/>
+            </a:effectRef>
+            <a:fontRef idx="minor">
+              <a:schemeClr val="dk1"/>
+            </a:fontRef>
+          </p:style>
+          <p:txBody>
+            <a:bodyPr rtlCol="0" anchor="ctr"/>
+            <a:lstStyle/>
+            <a:p>
+              <a:pPr algn="ctr"/>
+              <a:endParaRPr lang="en-US"/>
+            </a:p>
+          </p:txBody>
+        </p:sp>
+        <p:sp>
+          <p:nvSpPr>
+            <p:cNvPr id="8" name="Rectangle 7">
+              <a:extLst>
+                <a:ext uri="{FF2B5EF4-FFF2-40B4-BE49-F238E27FC236}">
+                  <a16:creationId xmlns:a16="http://schemas.microsoft.com/office/drawing/2014/main" id="{D11C6EAA-455C-4E3C-ABAD-FCBA70C8DA10}"/>
+                </a:ext>
+              </a:extLst>
+            </p:cNvPr>
+            <p:cNvSpPr/>
+            <p:nvPr/>
+          </p:nvSpPr>
+          <p:spPr>
+            <a:xfrm>
+              <a:off x="6149266" y="2569389"/>
+              <a:ext cx="1775534" cy="710214"/>
+            </a:xfrm>
+            <a:prstGeom prst="rect">
+              <a:avLst/>
+            </a:prstGeom>
+          </p:spPr>
+          <p:style>
+            <a:lnRef idx="2">
+              <a:schemeClr val="accent1">
+                <a:shade val="50000"/>
+              </a:schemeClr>
+            </a:lnRef>
+            <a:fillRef idx="1">
+              <a:schemeClr val="accent1"/>
+            </a:fillRef>
+            <a:effectRef idx="0">
+              <a:schemeClr val="accent1"/>
+            </a:effectRef>
+            <a:fontRef idx="minor">
+              <a:schemeClr val="lt1"/>
+            </a:fontRef>
+          </p:style>
+          <p:txBody>
+            <a:bodyPr rtlCol="0" anchor="ctr"/>
+            <a:lstStyle/>
+            <a:p>
+              <a:pPr algn="ctr"/>
+              <a:endParaRPr lang="en-US"/>
+            </a:p>
+          </p:txBody>
+        </p:sp>
+        <p:sp>
+          <p:nvSpPr>
+            <p:cNvPr id="9" name="Rectangle 8">
+              <a:extLst>
+                <a:ext uri="{FF2B5EF4-FFF2-40B4-BE49-F238E27FC236}">
+                  <a16:creationId xmlns:a16="http://schemas.microsoft.com/office/drawing/2014/main" id="{77263497-9374-445A-9EF0-AEC93CDF9DB8}"/>
+                </a:ext>
+              </a:extLst>
+            </p:cNvPr>
+            <p:cNvSpPr/>
+            <p:nvPr/>
+          </p:nvSpPr>
+          <p:spPr>
+            <a:xfrm>
+              <a:off x="8135645" y="2569389"/>
+              <a:ext cx="1775534" cy="710214"/>
+            </a:xfrm>
+            <a:prstGeom prst="rect">
+              <a:avLst/>
+            </a:prstGeom>
+          </p:spPr>
+          <p:style>
+            <a:lnRef idx="2">
+              <a:schemeClr val="accent1">
+                <a:shade val="50000"/>
+              </a:schemeClr>
+            </a:lnRef>
+            <a:fillRef idx="1">
+              <a:schemeClr val="accent1"/>
+            </a:fillRef>
+            <a:effectRef idx="0">
+              <a:schemeClr val="accent1"/>
+            </a:effectRef>
+            <a:fontRef idx="minor">
+              <a:schemeClr val="lt1"/>
+            </a:fontRef>
+          </p:style>
+          <p:txBody>
+            <a:bodyPr rtlCol="0" anchor="ctr"/>
+            <a:lstStyle/>
+            <a:p>
+              <a:pPr algn="ctr"/>
+              <a:endParaRPr lang="en-US"/>
+            </a:p>
+          </p:txBody>
+        </p:sp>
+        <p:sp>
+          <p:nvSpPr>
+            <p:cNvPr id="10" name="TextBox 9">
+              <a:extLst>
+                <a:ext uri="{FF2B5EF4-FFF2-40B4-BE49-F238E27FC236}">
+                  <a16:creationId xmlns:a16="http://schemas.microsoft.com/office/drawing/2014/main" id="{527F79EE-07C5-474D-B1A6-C9605593C995}"/>
+                </a:ext>
+              </a:extLst>
+            </p:cNvPr>
+            <p:cNvSpPr txBox="1"/>
+            <p:nvPr/>
+          </p:nvSpPr>
+          <p:spPr>
+            <a:xfrm>
+              <a:off x="3471004" y="2615515"/>
+              <a:ext cx="1974130" cy="646331"/>
+            </a:xfrm>
+            <a:prstGeom prst="rect">
+              <a:avLst/>
+            </a:prstGeom>
+            <a:noFill/>
+          </p:spPr>
+          <p:txBody>
+            <a:bodyPr wrap="none" rtlCol="0">
+              <a:spAutoFit/>
+            </a:bodyPr>
+            <a:lstStyle/>
+            <a:p>
+              <a:pPr algn="ctr"/>
+              <a:r>
+                <a:rPr lang="en-US" dirty="0"/>
+                <a:t>Photon Generation</a:t>
+              </a:r>
+              <a:br>
+                <a:rPr lang="en-US" dirty="0"/>
+              </a:br>
+              <a:r>
+                <a:rPr lang="en-US" dirty="0"/>
+                <a:t> and Traversal</a:t>
+              </a:r>
+            </a:p>
+          </p:txBody>
+        </p:sp>
+        <p:sp>
+          <p:nvSpPr>
+            <p:cNvPr id="11" name="TextBox 10">
+              <a:extLst>
+                <a:ext uri="{FF2B5EF4-FFF2-40B4-BE49-F238E27FC236}">
+                  <a16:creationId xmlns:a16="http://schemas.microsoft.com/office/drawing/2014/main" id="{F000DF1E-8DBD-4C5C-876E-F10967030F1F}"/>
+                </a:ext>
+              </a:extLst>
+            </p:cNvPr>
+            <p:cNvSpPr txBox="1"/>
+            <p:nvPr/>
+          </p:nvSpPr>
+          <p:spPr>
+            <a:xfrm>
+              <a:off x="6183978" y="2706086"/>
+              <a:ext cx="1706109" cy="369332"/>
+            </a:xfrm>
+            <a:prstGeom prst="rect">
+              <a:avLst/>
+            </a:prstGeom>
+            <a:noFill/>
+          </p:spPr>
+          <p:txBody>
+            <a:bodyPr wrap="none" rtlCol="0">
+              <a:spAutoFit/>
+            </a:bodyPr>
+            <a:lstStyle/>
+            <a:p>
+              <a:pPr algn="ctr"/>
+              <a:r>
+                <a:rPr lang="en-US" dirty="0"/>
+                <a:t>Screen Mapping</a:t>
+              </a:r>
+            </a:p>
+          </p:txBody>
+        </p:sp>
+        <p:sp>
+          <p:nvSpPr>
+            <p:cNvPr id="12" name="TextBox 11">
+              <a:extLst>
+                <a:ext uri="{FF2B5EF4-FFF2-40B4-BE49-F238E27FC236}">
+                  <a16:creationId xmlns:a16="http://schemas.microsoft.com/office/drawing/2014/main" id="{7DCC89AA-D51A-49E2-94AE-39FC61539A5B}"/>
+                </a:ext>
+              </a:extLst>
+            </p:cNvPr>
+            <p:cNvSpPr txBox="1"/>
+            <p:nvPr/>
+          </p:nvSpPr>
+          <p:spPr>
+            <a:xfrm>
+              <a:off x="8358261" y="2706086"/>
+              <a:ext cx="1330301" cy="369332"/>
+            </a:xfrm>
+            <a:prstGeom prst="rect">
+              <a:avLst/>
+            </a:prstGeom>
+            <a:noFill/>
+          </p:spPr>
+          <p:txBody>
+            <a:bodyPr wrap="none" rtlCol="0">
+              <a:spAutoFit/>
+            </a:bodyPr>
+            <a:lstStyle/>
+            <a:p>
+              <a:pPr algn="ctr"/>
+              <a:r>
+                <a:rPr lang="en-US" dirty="0"/>
+                <a:t>Final Gather</a:t>
+              </a:r>
+            </a:p>
+          </p:txBody>
+        </p:sp>
+        <p:sp>
+          <p:nvSpPr>
+            <p:cNvPr id="16" name="TextBox 15">
+              <a:extLst>
+                <a:ext uri="{FF2B5EF4-FFF2-40B4-BE49-F238E27FC236}">
+                  <a16:creationId xmlns:a16="http://schemas.microsoft.com/office/drawing/2014/main" id="{7D024A4D-EB40-437A-A95D-73C66EC9B5A3}"/>
+                </a:ext>
+              </a:extLst>
+            </p:cNvPr>
+            <p:cNvSpPr txBox="1"/>
+            <p:nvPr/>
+          </p:nvSpPr>
+          <p:spPr>
+            <a:xfrm>
+              <a:off x="1342951" y="4407282"/>
+              <a:ext cx="1382493" cy="646331"/>
+            </a:xfrm>
+            <a:prstGeom prst="rect">
+              <a:avLst/>
+            </a:prstGeom>
+            <a:noFill/>
+          </p:spPr>
+          <p:txBody>
+            <a:bodyPr wrap="none" rtlCol="0">
+              <a:spAutoFit/>
+            </a:bodyPr>
+            <a:lstStyle/>
+            <a:p>
+              <a:pPr algn="ctr"/>
+              <a:r>
+                <a:rPr lang="en-US" dirty="0">
+                  <a:solidFill>
+                    <a:schemeClr val="bg1"/>
+                  </a:solidFill>
+                </a:rPr>
+                <a:t>Ray Dispatch</a:t>
+              </a:r>
+              <a:br>
+                <a:rPr lang="en-US" dirty="0">
+                  <a:solidFill>
+                    <a:schemeClr val="bg1"/>
+                  </a:solidFill>
+                </a:rPr>
+              </a:br>
+              <a:r>
+                <a:rPr lang="en-US" dirty="0">
+                  <a:solidFill>
+                    <a:schemeClr val="bg1"/>
+                  </a:solidFill>
+                </a:rPr>
+                <a:t> Parameters</a:t>
+              </a:r>
+            </a:p>
+          </p:txBody>
+        </p:sp>
+        <p:grpSp>
+          <p:nvGrpSpPr>
+            <p:cNvPr id="51" name="Group 50">
+              <a:extLst>
+                <a:ext uri="{FF2B5EF4-FFF2-40B4-BE49-F238E27FC236}">
+                  <a16:creationId xmlns:a16="http://schemas.microsoft.com/office/drawing/2014/main" id="{F6ED9F50-CA19-426B-884B-99B7C0DB4E3D}"/>
+                </a:ext>
+              </a:extLst>
+            </p:cNvPr>
+            <p:cNvGrpSpPr/>
+            <p:nvPr/>
+          </p:nvGrpSpPr>
+          <p:grpSpPr>
+            <a:xfrm>
+              <a:off x="3530382" y="4082069"/>
+              <a:ext cx="1748772" cy="1262289"/>
+              <a:chOff x="2660371" y="2457455"/>
+              <a:chExt cx="1748772" cy="1262289"/>
+            </a:xfrm>
+          </p:grpSpPr>
+          <p:sp>
+            <p:nvSpPr>
+              <p:cNvPr id="45" name="Rectangle 44">
+                <a:extLst>
+                  <a:ext uri="{FF2B5EF4-FFF2-40B4-BE49-F238E27FC236}">
+                    <a16:creationId xmlns:a16="http://schemas.microsoft.com/office/drawing/2014/main" id="{805E7D3D-81C4-4A2B-819D-574FEB4F0DE1}"/>
+                  </a:ext>
+                </a:extLst>
+              </p:cNvPr>
+              <p:cNvSpPr/>
+              <p:nvPr/>
+            </p:nvSpPr>
+            <p:spPr>
+              <a:xfrm>
+                <a:off x="2660371" y="2457455"/>
+                <a:ext cx="1671963" cy="1262289"/>
+              </a:xfrm>
+              <a:prstGeom prst="rect">
+                <a:avLst/>
+              </a:prstGeom>
+            </p:spPr>
+            <p:style>
+              <a:lnRef idx="2">
+                <a:schemeClr val="accent1">
+                  <a:shade val="50000"/>
+                </a:schemeClr>
+              </a:lnRef>
+              <a:fillRef idx="1">
+                <a:schemeClr val="accent1"/>
+              </a:fillRef>
+              <a:effectRef idx="0">
+                <a:schemeClr val="accent1"/>
+              </a:effectRef>
+              <a:fontRef idx="minor">
+                <a:schemeClr val="lt1"/>
+              </a:fontRef>
+            </p:style>
+            <p:txBody>
+              <a:bodyPr rtlCol="0" anchor="ctr"/>
+              <a:lstStyle/>
+              <a:p>
+                <a:pPr algn="ctr"/>
+                <a:endParaRPr lang="en-US"/>
+              </a:p>
+            </p:txBody>
+          </p:sp>
+          <p:sp>
+            <p:nvSpPr>
+              <p:cNvPr id="46" name="TextBox 45">
+                <a:extLst>
+                  <a:ext uri="{FF2B5EF4-FFF2-40B4-BE49-F238E27FC236}">
+                    <a16:creationId xmlns:a16="http://schemas.microsoft.com/office/drawing/2014/main" id="{A88792EF-768E-4129-B663-09223EFBCB1D}"/>
+                  </a:ext>
+                </a:extLst>
+              </p:cNvPr>
+              <p:cNvSpPr txBox="1"/>
+              <p:nvPr/>
+            </p:nvSpPr>
+            <p:spPr>
+              <a:xfrm>
+                <a:off x="2700835" y="2457455"/>
+                <a:ext cx="1708308" cy="523220"/>
+              </a:xfrm>
+              <a:prstGeom prst="rect">
+                <a:avLst/>
+              </a:prstGeom>
+              <a:noFill/>
+            </p:spPr>
+            <p:txBody>
+              <a:bodyPr wrap="square" rtlCol="0">
+                <a:spAutoFit/>
+              </a:bodyPr>
+              <a:lstStyle/>
+              <a:p>
+                <a:pPr algn="ctr"/>
+                <a:r>
+                  <a:rPr lang="en-US" sz="1400" b="1" dirty="0"/>
+                  <a:t>Width</a:t>
+                </a:r>
+                <a:r>
+                  <a:rPr lang="en-US" sz="1400" dirty="0"/>
+                  <a:t> : sqrt(numPhotons)</a:t>
+                </a:r>
+              </a:p>
+            </p:txBody>
+          </p:sp>
+          <p:sp>
+            <p:nvSpPr>
+              <p:cNvPr id="49" name="TextBox 48">
+                <a:extLst>
+                  <a:ext uri="{FF2B5EF4-FFF2-40B4-BE49-F238E27FC236}">
+                    <a16:creationId xmlns:a16="http://schemas.microsoft.com/office/drawing/2014/main" id="{354A2C09-918E-45DA-8A3B-1AD0A4FED8FF}"/>
+                  </a:ext>
+                </a:extLst>
+              </p:cNvPr>
+              <p:cNvSpPr txBox="1"/>
+              <p:nvPr/>
+            </p:nvSpPr>
+            <p:spPr>
+              <a:xfrm>
+                <a:off x="2684494" y="2883471"/>
+                <a:ext cx="1708308" cy="523220"/>
+              </a:xfrm>
+              <a:prstGeom prst="rect">
+                <a:avLst/>
+              </a:prstGeom>
+              <a:noFill/>
+            </p:spPr>
+            <p:txBody>
+              <a:bodyPr wrap="square" rtlCol="0">
+                <a:spAutoFit/>
+              </a:bodyPr>
+              <a:lstStyle/>
+              <a:p>
+                <a:pPr algn="ctr"/>
+                <a:r>
+                  <a:rPr lang="en-US" sz="1400" b="1" dirty="0"/>
+                  <a:t>Height</a:t>
+                </a:r>
+                <a:r>
+                  <a:rPr lang="en-US" sz="1400" dirty="0"/>
+                  <a:t> : sqrt(numPhotons)</a:t>
+                </a:r>
+              </a:p>
+            </p:txBody>
+          </p:sp>
+          <p:sp>
+            <p:nvSpPr>
+              <p:cNvPr id="50" name="TextBox 49">
+                <a:extLst>
+                  <a:ext uri="{FF2B5EF4-FFF2-40B4-BE49-F238E27FC236}">
+                    <a16:creationId xmlns:a16="http://schemas.microsoft.com/office/drawing/2014/main" id="{70393A1C-8D95-4E0C-9274-2DE1D7A7E8AD}"/>
+                  </a:ext>
+                </a:extLst>
+              </p:cNvPr>
+              <p:cNvSpPr txBox="1"/>
+              <p:nvPr/>
+            </p:nvSpPr>
+            <p:spPr>
+              <a:xfrm>
+                <a:off x="2676712" y="3344424"/>
+                <a:ext cx="1708308" cy="307777"/>
+              </a:xfrm>
+              <a:prstGeom prst="rect">
+                <a:avLst/>
+              </a:prstGeom>
+              <a:noFill/>
+            </p:spPr>
+            <p:txBody>
+              <a:bodyPr wrap="square" rtlCol="0">
+                <a:spAutoFit/>
+              </a:bodyPr>
+              <a:lstStyle/>
+              <a:p>
+                <a:pPr algn="ctr"/>
+                <a:r>
+                  <a:rPr lang="en-US" sz="1400" b="1" dirty="0"/>
+                  <a:t>Depth</a:t>
+                </a:r>
+                <a:r>
+                  <a:rPr lang="en-US" sz="1400" dirty="0"/>
+                  <a:t> : MaxBounces</a:t>
+                </a:r>
+              </a:p>
+            </p:txBody>
+          </p:sp>
+        </p:grpSp>
+        <p:grpSp>
+          <p:nvGrpSpPr>
+            <p:cNvPr id="62" name="Group 61">
+              <a:extLst>
+                <a:ext uri="{FF2B5EF4-FFF2-40B4-BE49-F238E27FC236}">
+                  <a16:creationId xmlns:a16="http://schemas.microsoft.com/office/drawing/2014/main" id="{265EAACB-6FE3-48F0-88E8-F9BD16A77559}"/>
+                </a:ext>
+              </a:extLst>
+            </p:cNvPr>
+            <p:cNvGrpSpPr/>
+            <p:nvPr/>
+          </p:nvGrpSpPr>
+          <p:grpSpPr>
+            <a:xfrm>
+              <a:off x="6091624" y="4076490"/>
+              <a:ext cx="1748772" cy="1262289"/>
+              <a:chOff x="2660371" y="2457455"/>
+              <a:chExt cx="1748772" cy="1262289"/>
+            </a:xfrm>
+          </p:grpSpPr>
+          <p:sp>
+            <p:nvSpPr>
+              <p:cNvPr id="63" name="Rectangle 62">
+                <a:extLst>
+                  <a:ext uri="{FF2B5EF4-FFF2-40B4-BE49-F238E27FC236}">
+                    <a16:creationId xmlns:a16="http://schemas.microsoft.com/office/drawing/2014/main" id="{B4E371EF-E122-46EC-9082-F56CAB653179}"/>
+                  </a:ext>
+                </a:extLst>
+              </p:cNvPr>
+              <p:cNvSpPr/>
+              <p:nvPr/>
+            </p:nvSpPr>
+            <p:spPr>
+              <a:xfrm>
+                <a:off x="2660371" y="2457455"/>
+                <a:ext cx="1671963" cy="1262289"/>
+              </a:xfrm>
+              <a:prstGeom prst="rect">
+                <a:avLst/>
+              </a:prstGeom>
+            </p:spPr>
+            <p:style>
+              <a:lnRef idx="2">
+                <a:schemeClr val="accent1">
+                  <a:shade val="50000"/>
+                </a:schemeClr>
+              </a:lnRef>
+              <a:fillRef idx="1">
+                <a:schemeClr val="accent1"/>
+              </a:fillRef>
+              <a:effectRef idx="0">
+                <a:schemeClr val="accent1"/>
+              </a:effectRef>
+              <a:fontRef idx="minor">
+                <a:schemeClr val="lt1"/>
+              </a:fontRef>
+            </p:style>
+            <p:txBody>
+              <a:bodyPr rtlCol="0" anchor="ctr"/>
+              <a:lstStyle/>
+              <a:p>
+                <a:pPr algn="ctr"/>
+                <a:endParaRPr lang="en-US"/>
+              </a:p>
+            </p:txBody>
+          </p:sp>
+          <p:sp>
+            <p:nvSpPr>
+              <p:cNvPr id="64" name="TextBox 63">
+                <a:extLst>
+                  <a:ext uri="{FF2B5EF4-FFF2-40B4-BE49-F238E27FC236}">
+                    <a16:creationId xmlns:a16="http://schemas.microsoft.com/office/drawing/2014/main" id="{A1B7F314-1166-4012-ADF7-121773AED4AF}"/>
+                  </a:ext>
+                </a:extLst>
+              </p:cNvPr>
+              <p:cNvSpPr txBox="1"/>
+              <p:nvPr/>
+            </p:nvSpPr>
+            <p:spPr>
+              <a:xfrm>
+                <a:off x="2700835" y="2457455"/>
+                <a:ext cx="1708308" cy="523220"/>
+              </a:xfrm>
+              <a:prstGeom prst="rect">
+                <a:avLst/>
+              </a:prstGeom>
+              <a:noFill/>
+            </p:spPr>
+            <p:txBody>
+              <a:bodyPr wrap="square" rtlCol="0">
+                <a:spAutoFit/>
+              </a:bodyPr>
+              <a:lstStyle/>
+              <a:p>
+                <a:pPr algn="ctr"/>
+                <a:r>
+                  <a:rPr lang="en-US" sz="1400" b="1" dirty="0"/>
+                  <a:t>Width</a:t>
+                </a:r>
+                <a:r>
+                  <a:rPr lang="en-US" sz="1400" dirty="0"/>
+                  <a:t> : sqrt(numPhotons)</a:t>
+                </a:r>
+              </a:p>
+            </p:txBody>
+          </p:sp>
+          <p:sp>
+            <p:nvSpPr>
+              <p:cNvPr id="65" name="TextBox 64">
+                <a:extLst>
+                  <a:ext uri="{FF2B5EF4-FFF2-40B4-BE49-F238E27FC236}">
+                    <a16:creationId xmlns:a16="http://schemas.microsoft.com/office/drawing/2014/main" id="{E50D52A9-4D62-4B0E-B4A8-FB9430D38E7D}"/>
+                  </a:ext>
+                </a:extLst>
+              </p:cNvPr>
+              <p:cNvSpPr txBox="1"/>
+              <p:nvPr/>
+            </p:nvSpPr>
+            <p:spPr>
+              <a:xfrm>
+                <a:off x="2684494" y="2883471"/>
+                <a:ext cx="1708308" cy="523220"/>
+              </a:xfrm>
+              <a:prstGeom prst="rect">
+                <a:avLst/>
+              </a:prstGeom>
+              <a:noFill/>
+            </p:spPr>
+            <p:txBody>
+              <a:bodyPr wrap="square" rtlCol="0">
+                <a:spAutoFit/>
+              </a:bodyPr>
+              <a:lstStyle/>
+              <a:p>
+                <a:pPr algn="ctr"/>
+                <a:r>
+                  <a:rPr lang="en-US" sz="1400" b="1" dirty="0"/>
+                  <a:t>Height</a:t>
+                </a:r>
+                <a:r>
+                  <a:rPr lang="en-US" sz="1400" dirty="0"/>
+                  <a:t> : sqrt(numPhotons)</a:t>
+                </a:r>
+              </a:p>
+            </p:txBody>
+          </p:sp>
+          <p:sp>
+            <p:nvSpPr>
+              <p:cNvPr id="66" name="TextBox 65">
+                <a:extLst>
+                  <a:ext uri="{FF2B5EF4-FFF2-40B4-BE49-F238E27FC236}">
+                    <a16:creationId xmlns:a16="http://schemas.microsoft.com/office/drawing/2014/main" id="{6AC16830-698B-4F44-B6CA-5EB0DC39F43F}"/>
+                  </a:ext>
+                </a:extLst>
+              </p:cNvPr>
+              <p:cNvSpPr txBox="1"/>
+              <p:nvPr/>
+            </p:nvSpPr>
+            <p:spPr>
+              <a:xfrm>
+                <a:off x="2676712" y="3344424"/>
+                <a:ext cx="1708308" cy="307777"/>
+              </a:xfrm>
+              <a:prstGeom prst="rect">
+                <a:avLst/>
+              </a:prstGeom>
+              <a:noFill/>
+            </p:spPr>
+            <p:txBody>
+              <a:bodyPr wrap="square" rtlCol="0">
+                <a:spAutoFit/>
+              </a:bodyPr>
+              <a:lstStyle/>
+              <a:p>
+                <a:pPr algn="ctr"/>
+                <a:r>
+                  <a:rPr lang="en-US" sz="1400" b="1" dirty="0"/>
+                  <a:t>Depth</a:t>
+                </a:r>
+                <a:r>
+                  <a:rPr lang="en-US" sz="1400" dirty="0"/>
+                  <a:t> : MaxBounces</a:t>
+                </a:r>
+              </a:p>
+            </p:txBody>
+          </p:sp>
+        </p:grpSp>
+        <p:grpSp>
+          <p:nvGrpSpPr>
+            <p:cNvPr id="67" name="Group 66">
+              <a:extLst>
+                <a:ext uri="{FF2B5EF4-FFF2-40B4-BE49-F238E27FC236}">
+                  <a16:creationId xmlns:a16="http://schemas.microsoft.com/office/drawing/2014/main" id="{42C5AFB2-7C6F-4D0A-9AF3-377125D4455C}"/>
+                </a:ext>
+              </a:extLst>
+            </p:cNvPr>
+            <p:cNvGrpSpPr/>
+            <p:nvPr/>
+          </p:nvGrpSpPr>
+          <p:grpSpPr>
+            <a:xfrm>
+              <a:off x="8029353" y="4099302"/>
+              <a:ext cx="1838287" cy="1262289"/>
+              <a:chOff x="2611721" y="2457455"/>
+              <a:chExt cx="1838287" cy="1262289"/>
+            </a:xfrm>
+          </p:grpSpPr>
+          <p:sp>
+            <p:nvSpPr>
+              <p:cNvPr id="68" name="Rectangle 67">
+                <a:extLst>
+                  <a:ext uri="{FF2B5EF4-FFF2-40B4-BE49-F238E27FC236}">
+                    <a16:creationId xmlns:a16="http://schemas.microsoft.com/office/drawing/2014/main" id="{7E9FD372-3214-4916-A6EE-887179228AAE}"/>
+                  </a:ext>
+                </a:extLst>
+              </p:cNvPr>
+              <p:cNvSpPr/>
+              <p:nvPr/>
+            </p:nvSpPr>
+            <p:spPr>
+              <a:xfrm>
+                <a:off x="2660371" y="2457455"/>
+                <a:ext cx="1671963" cy="1262289"/>
+              </a:xfrm>
+              <a:prstGeom prst="rect">
+                <a:avLst/>
+              </a:prstGeom>
+            </p:spPr>
+            <p:style>
+              <a:lnRef idx="2">
+                <a:schemeClr val="accent1">
+                  <a:shade val="50000"/>
+                </a:schemeClr>
+              </a:lnRef>
+              <a:fillRef idx="1">
+                <a:schemeClr val="accent1"/>
+              </a:fillRef>
+              <a:effectRef idx="0">
+                <a:schemeClr val="accent1"/>
+              </a:effectRef>
+              <a:fontRef idx="minor">
+                <a:schemeClr val="lt1"/>
+              </a:fontRef>
+            </p:style>
+            <p:txBody>
+              <a:bodyPr rtlCol="0" anchor="ctr"/>
+              <a:lstStyle/>
+              <a:p>
+                <a:pPr algn="ctr"/>
+                <a:endParaRPr lang="en-US"/>
+              </a:p>
+            </p:txBody>
+          </p:sp>
+          <p:sp>
+            <p:nvSpPr>
+              <p:cNvPr id="69" name="TextBox 68">
+                <a:extLst>
+                  <a:ext uri="{FF2B5EF4-FFF2-40B4-BE49-F238E27FC236}">
+                    <a16:creationId xmlns:a16="http://schemas.microsoft.com/office/drawing/2014/main" id="{2C61262B-6017-4515-A45B-650223D7C4F5}"/>
+                  </a:ext>
+                </a:extLst>
+              </p:cNvPr>
+              <p:cNvSpPr txBox="1"/>
+              <p:nvPr/>
+            </p:nvSpPr>
+            <p:spPr>
+              <a:xfrm>
+                <a:off x="2639819" y="2476580"/>
+                <a:ext cx="1708308" cy="307777"/>
+              </a:xfrm>
+              <a:prstGeom prst="rect">
+                <a:avLst/>
+              </a:prstGeom>
+              <a:noFill/>
+            </p:spPr>
+            <p:txBody>
+              <a:bodyPr wrap="square" rtlCol="0">
+                <a:spAutoFit/>
+              </a:bodyPr>
+              <a:lstStyle/>
+              <a:p>
+                <a:r>
+                  <a:rPr lang="en-US" sz="1400" b="1" dirty="0"/>
+                  <a:t>Width</a:t>
+                </a:r>
+                <a:r>
+                  <a:rPr lang="en-US" sz="1400" dirty="0"/>
+                  <a:t> : ScreenWidth</a:t>
+                </a:r>
+              </a:p>
+            </p:txBody>
+          </p:sp>
+          <p:sp>
+            <p:nvSpPr>
+              <p:cNvPr id="70" name="TextBox 69">
+                <a:extLst>
+                  <a:ext uri="{FF2B5EF4-FFF2-40B4-BE49-F238E27FC236}">
+                    <a16:creationId xmlns:a16="http://schemas.microsoft.com/office/drawing/2014/main" id="{0BFD17F3-3E28-4DBF-8082-091F07ABFBE3}"/>
+                  </a:ext>
+                </a:extLst>
+              </p:cNvPr>
+              <p:cNvSpPr txBox="1"/>
+              <p:nvPr/>
+            </p:nvSpPr>
+            <p:spPr>
+              <a:xfrm>
+                <a:off x="2611721" y="2875695"/>
+                <a:ext cx="1838287" cy="307777"/>
+              </a:xfrm>
+              <a:prstGeom prst="rect">
+                <a:avLst/>
+              </a:prstGeom>
+              <a:noFill/>
+            </p:spPr>
+            <p:txBody>
+              <a:bodyPr wrap="square" rtlCol="0">
+                <a:spAutoFit/>
+              </a:bodyPr>
+              <a:lstStyle/>
+              <a:p>
+                <a:r>
+                  <a:rPr lang="en-US" sz="1400" b="1" dirty="0"/>
+                  <a:t>Height</a:t>
+                </a:r>
+                <a:r>
+                  <a:rPr lang="en-US" sz="1400" dirty="0"/>
+                  <a:t> : ScreenHeight</a:t>
+                </a:r>
+              </a:p>
+            </p:txBody>
+          </p:sp>
+          <p:sp>
+            <p:nvSpPr>
+              <p:cNvPr id="71" name="TextBox 70">
+                <a:extLst>
+                  <a:ext uri="{FF2B5EF4-FFF2-40B4-BE49-F238E27FC236}">
+                    <a16:creationId xmlns:a16="http://schemas.microsoft.com/office/drawing/2014/main" id="{57E33C97-6F07-4AA6-8769-4E491ED9116F}"/>
+                  </a:ext>
+                </a:extLst>
+              </p:cNvPr>
+              <p:cNvSpPr txBox="1"/>
+              <p:nvPr/>
+            </p:nvSpPr>
+            <p:spPr>
+              <a:xfrm>
+                <a:off x="2694450" y="3253203"/>
+                <a:ext cx="1708308" cy="307777"/>
+              </a:xfrm>
+              <a:prstGeom prst="rect">
+                <a:avLst/>
+              </a:prstGeom>
+              <a:noFill/>
+            </p:spPr>
+            <p:txBody>
+              <a:bodyPr wrap="square" rtlCol="0">
+                <a:spAutoFit/>
+              </a:bodyPr>
+              <a:lstStyle/>
+              <a:p>
+                <a:pPr algn="ctr"/>
+                <a:r>
+                  <a:rPr lang="en-US" sz="1400" b="1" dirty="0"/>
+                  <a:t>Depth</a:t>
+                </a:r>
+                <a:r>
+                  <a:rPr lang="en-US" sz="1400" dirty="0"/>
+                  <a:t> : 1</a:t>
+                </a:r>
+              </a:p>
+            </p:txBody>
+          </p:sp>
+        </p:grpSp>
+        <p:sp>
+          <p:nvSpPr>
+            <p:cNvPr id="77" name="TextBox 76">
+              <a:extLst>
+                <a:ext uri="{FF2B5EF4-FFF2-40B4-BE49-F238E27FC236}">
+                  <a16:creationId xmlns:a16="http://schemas.microsoft.com/office/drawing/2014/main" id="{607D87FC-4E76-4676-8002-59FD2C19DB96}"/>
+                </a:ext>
+              </a:extLst>
+            </p:cNvPr>
+            <p:cNvSpPr txBox="1"/>
+            <p:nvPr/>
+          </p:nvSpPr>
+          <p:spPr>
+            <a:xfrm>
+              <a:off x="3650103" y="2072375"/>
+              <a:ext cx="1604928" cy="369332"/>
+            </a:xfrm>
+            <a:prstGeom prst="rect">
+              <a:avLst/>
+            </a:prstGeom>
+            <a:noFill/>
+          </p:spPr>
+          <p:txBody>
+            <a:bodyPr wrap="none" rtlCol="0">
+              <a:spAutoFit/>
+            </a:bodyPr>
+            <a:lstStyle/>
+            <a:p>
+              <a:pPr algn="ctr"/>
+              <a:r>
+                <a:rPr lang="en-US" i="1" dirty="0">
+                  <a:solidFill>
+                    <a:schemeClr val="bg1"/>
+                  </a:solidFill>
+                </a:rPr>
+                <a:t>once per scene</a:t>
+              </a:r>
+            </a:p>
+          </p:txBody>
+        </p:sp>
+        <p:sp>
+          <p:nvSpPr>
+            <p:cNvPr id="78" name="TextBox 77">
+              <a:extLst>
+                <a:ext uri="{FF2B5EF4-FFF2-40B4-BE49-F238E27FC236}">
+                  <a16:creationId xmlns:a16="http://schemas.microsoft.com/office/drawing/2014/main" id="{ED8C8E61-5E37-4FA9-9B8D-44DF2CB82317}"/>
+                </a:ext>
+              </a:extLst>
+            </p:cNvPr>
+            <p:cNvSpPr txBox="1"/>
+            <p:nvPr/>
+          </p:nvSpPr>
+          <p:spPr>
+            <a:xfrm>
+              <a:off x="7319388" y="2049136"/>
+              <a:ext cx="1303306" cy="369332"/>
+            </a:xfrm>
+            <a:prstGeom prst="rect">
+              <a:avLst/>
+            </a:prstGeom>
+            <a:noFill/>
+          </p:spPr>
+          <p:txBody>
+            <a:bodyPr wrap="none" rtlCol="0">
+              <a:spAutoFit/>
+            </a:bodyPr>
+            <a:lstStyle/>
+            <a:p>
+              <a:pPr algn="ctr"/>
+              <a:r>
+                <a:rPr lang="en-US" i="1" dirty="0">
+                  <a:solidFill>
+                    <a:schemeClr val="bg1"/>
+                  </a:solidFill>
+                </a:rPr>
+                <a:t>every frame</a:t>
+              </a:r>
+            </a:p>
+          </p:txBody>
+        </p:sp>
+        <p:sp>
+          <p:nvSpPr>
+            <p:cNvPr id="79" name="TextBox 78">
+              <a:extLst>
+                <a:ext uri="{FF2B5EF4-FFF2-40B4-BE49-F238E27FC236}">
+                  <a16:creationId xmlns:a16="http://schemas.microsoft.com/office/drawing/2014/main" id="{9250683C-A166-429A-9B0A-75F34423C84E}"/>
+                </a:ext>
+              </a:extLst>
+            </p:cNvPr>
+            <p:cNvSpPr txBox="1"/>
+            <p:nvPr/>
+          </p:nvSpPr>
+          <p:spPr>
+            <a:xfrm>
+              <a:off x="4571806" y="1369040"/>
+              <a:ext cx="3224344" cy="369332"/>
+            </a:xfrm>
+            <a:prstGeom prst="rect">
+              <a:avLst/>
+            </a:prstGeom>
+            <a:noFill/>
+          </p:spPr>
+          <p:txBody>
+            <a:bodyPr wrap="none" rtlCol="0">
+              <a:spAutoFit/>
+            </a:bodyPr>
+            <a:lstStyle/>
+            <a:p>
+              <a:r>
+                <a:rPr lang="en-US" b="1" dirty="0">
+                  <a:solidFill>
+                    <a:schemeClr val="bg1"/>
+                  </a:solidFill>
+                </a:rPr>
+                <a:t>Photon Major Iterator Renderer</a:t>
+              </a:r>
+            </a:p>
+          </p:txBody>
+        </p:sp>
+      </p:grpSp>
+    </p:spTree>
+    <p:extLst>
+      <p:ext uri="{BB962C8B-B14F-4D97-AF65-F5344CB8AC3E}">
+        <p14:creationId xmlns:p14="http://schemas.microsoft.com/office/powerpoint/2010/main" val="3622798517"/>
+      </p:ext>
+    </p:extLst>
+  </p:cSld>
+  <p:clrMapOvr>
+    <a:masterClrMapping/>
+  </p:clrMapOvr>
+</p:sld>
+</file>
+
+<file path=ppt/slides/slide6.xml><?xml version="1.0" encoding="utf-8"?>
+<p:sld xmlns:a="http://schemas.openxmlformats.org/drawingml/2006/main" xmlns:r="http://schemas.openxmlformats.org/officeDocument/2006/relationships" xmlns:p="http://schemas.openxmlformats.org/presentationml/2006/main">
+  <p:cSld>
+    <p:spTree>
+      <p:nvGrpSpPr>
+        <p:cNvPr id="1" name=""/>
+        <p:cNvGrpSpPr/>
+        <p:nvPr/>
+      </p:nvGrpSpPr>
+      <p:grpSpPr>
+        <a:xfrm>
+          <a:off x="0" y="0"/>
+          <a:ext cx="0" cy="0"/>
+          <a:chOff x="0" y="0"/>
+          <a:chExt cx="0" cy="0"/>
+        </a:xfrm>
+      </p:grpSpPr>
+      <p:grpSp>
+        <p:nvGrpSpPr>
+          <p:cNvPr id="2" name="Group 1">
+            <a:extLst>
+              <a:ext uri="{FF2B5EF4-FFF2-40B4-BE49-F238E27FC236}">
+                <a16:creationId xmlns:a16="http://schemas.microsoft.com/office/drawing/2014/main" id="{E8046594-70B3-43A9-89FB-234FD11C3780}"/>
+              </a:ext>
+            </a:extLst>
+          </p:cNvPr>
+          <p:cNvGrpSpPr/>
+          <p:nvPr/>
+        </p:nvGrpSpPr>
+        <p:grpSpPr>
+          <a:xfrm>
+            <a:off x="1207362" y="1198486"/>
+            <a:ext cx="9194278" cy="4492102"/>
+            <a:chOff x="1207362" y="1198486"/>
+            <a:chExt cx="9194278" cy="4492102"/>
+          </a:xfrm>
+        </p:grpSpPr>
+        <p:sp>
+          <p:nvSpPr>
+            <p:cNvPr id="4" name="Rectangle 3">
+              <a:extLst>
+                <a:ext uri="{FF2B5EF4-FFF2-40B4-BE49-F238E27FC236}">
+                  <a16:creationId xmlns:a16="http://schemas.microsoft.com/office/drawing/2014/main" id="{1ECD46F7-0F18-453B-ABBE-891E0835635A}"/>
+                </a:ext>
+              </a:extLst>
+            </p:cNvPr>
+            <p:cNvSpPr/>
+            <p:nvPr/>
+          </p:nvSpPr>
+          <p:spPr>
+            <a:xfrm>
+              <a:off x="1207362" y="1198486"/>
+              <a:ext cx="9194278" cy="4492102"/>
+            </a:xfrm>
+            <a:prstGeom prst="rect">
+              <a:avLst/>
+            </a:prstGeom>
+            <a:solidFill>
+              <a:schemeClr val="tx1">
+                <a:lumMod val="75000"/>
+                <a:lumOff val="25000"/>
+              </a:schemeClr>
+            </a:solidFill>
+          </p:spPr>
+          <p:style>
+            <a:lnRef idx="2">
+              <a:schemeClr val="accent3">
+                <a:shade val="50000"/>
+              </a:schemeClr>
+            </a:lnRef>
+            <a:fillRef idx="1">
+              <a:schemeClr val="accent3"/>
+            </a:fillRef>
+            <a:effectRef idx="0">
+              <a:schemeClr val="accent3"/>
+            </a:effectRef>
+            <a:fontRef idx="minor">
+              <a:schemeClr val="lt1"/>
+            </a:fontRef>
+          </p:style>
+          <p:txBody>
+            <a:bodyPr rtlCol="0" anchor="ctr"/>
+            <a:lstStyle/>
+            <a:p>
+              <a:pPr algn="ctr"/>
+              <a:endParaRPr lang="en-US" dirty="0"/>
+            </a:p>
+          </p:txBody>
+        </p:sp>
+        <p:sp>
+          <p:nvSpPr>
+            <p:cNvPr id="5" name="Rectangle 4">
+              <a:extLst>
+                <a:ext uri="{FF2B5EF4-FFF2-40B4-BE49-F238E27FC236}">
+                  <a16:creationId xmlns:a16="http://schemas.microsoft.com/office/drawing/2014/main" id="{94755375-D01E-4405-8426-23B8BA689894}"/>
+                </a:ext>
+              </a:extLst>
+            </p:cNvPr>
+            <p:cNvSpPr/>
+            <p:nvPr/>
+          </p:nvSpPr>
+          <p:spPr>
+            <a:xfrm>
+              <a:off x="2876365" y="1979722"/>
+              <a:ext cx="5983550" cy="1633490"/>
+            </a:xfrm>
+            <a:prstGeom prst="rect">
+              <a:avLst/>
+            </a:prstGeom>
+          </p:spPr>
+          <p:style>
+            <a:lnRef idx="2">
+              <a:schemeClr val="accent1">
+                <a:shade val="50000"/>
+              </a:schemeClr>
+            </a:lnRef>
+            <a:fillRef idx="1">
+              <a:schemeClr val="accent1"/>
+            </a:fillRef>
+            <a:effectRef idx="0">
+              <a:schemeClr val="accent1"/>
+            </a:effectRef>
+            <a:fontRef idx="minor">
+              <a:schemeClr val="lt1"/>
+            </a:fontRef>
+          </p:style>
+          <p:txBody>
+            <a:bodyPr rtlCol="0" anchor="ctr"/>
+            <a:lstStyle/>
+            <a:p>
+              <a:pPr algn="ctr"/>
+              <a:endParaRPr lang="en-US"/>
+            </a:p>
+          </p:txBody>
+        </p:sp>
+        <p:sp>
+          <p:nvSpPr>
+            <p:cNvPr id="6" name="Rectangle 5">
+              <a:extLst>
+                <a:ext uri="{FF2B5EF4-FFF2-40B4-BE49-F238E27FC236}">
+                  <a16:creationId xmlns:a16="http://schemas.microsoft.com/office/drawing/2014/main" id="{70730980-1700-4ACA-B22A-8BA5F35A1B6E}"/>
+                </a:ext>
+              </a:extLst>
+            </p:cNvPr>
+            <p:cNvSpPr/>
+            <p:nvPr/>
+          </p:nvSpPr>
+          <p:spPr>
+            <a:xfrm>
+              <a:off x="3112362" y="2418469"/>
+              <a:ext cx="2691415" cy="1012056"/>
+            </a:xfrm>
+            <a:prstGeom prst="rect">
+              <a:avLst/>
+            </a:prstGeom>
+          </p:spPr>
+          <p:style>
+            <a:lnRef idx="1">
+              <a:schemeClr val="accent1"/>
+            </a:lnRef>
+            <a:fillRef idx="2">
+              <a:schemeClr val="accent1"/>
+            </a:fillRef>
+            <a:effectRef idx="1">
+              <a:schemeClr val="accent1"/>
+            </a:effectRef>
+            <a:fontRef idx="minor">
+              <a:schemeClr val="dk1"/>
+            </a:fontRef>
+          </p:style>
+          <p:txBody>
+            <a:bodyPr rtlCol="0" anchor="ctr"/>
+            <a:lstStyle/>
+            <a:p>
+              <a:pPr algn="ctr"/>
+              <a:endParaRPr lang="en-US" dirty="0"/>
+            </a:p>
+          </p:txBody>
+        </p:sp>
+        <p:sp>
+          <p:nvSpPr>
+            <p:cNvPr id="7" name="Rectangle 6">
+              <a:extLst>
+                <a:ext uri="{FF2B5EF4-FFF2-40B4-BE49-F238E27FC236}">
+                  <a16:creationId xmlns:a16="http://schemas.microsoft.com/office/drawing/2014/main" id="{82A5F7BA-FC39-45F6-AEE7-A94882B49DD7}"/>
+                </a:ext>
+              </a:extLst>
+            </p:cNvPr>
+            <p:cNvSpPr/>
+            <p:nvPr/>
+          </p:nvSpPr>
+          <p:spPr>
+            <a:xfrm>
+              <a:off x="5956177" y="2418469"/>
+              <a:ext cx="2691416" cy="1012055"/>
+            </a:xfrm>
+            <a:prstGeom prst="rect">
+              <a:avLst/>
+            </a:prstGeom>
+          </p:spPr>
+          <p:style>
+            <a:lnRef idx="1">
+              <a:schemeClr val="accent1"/>
+            </a:lnRef>
+            <a:fillRef idx="2">
+              <a:schemeClr val="accent1"/>
+            </a:fillRef>
+            <a:effectRef idx="1">
+              <a:schemeClr val="accent1"/>
+            </a:effectRef>
+            <a:fontRef idx="minor">
+              <a:schemeClr val="dk1"/>
+            </a:fontRef>
+          </p:style>
+          <p:txBody>
+            <a:bodyPr rtlCol="0" anchor="ctr"/>
+            <a:lstStyle/>
+            <a:p>
+              <a:pPr algn="ctr"/>
+              <a:endParaRPr lang="en-US"/>
+            </a:p>
+          </p:txBody>
+        </p:sp>
+        <p:sp>
+          <p:nvSpPr>
+            <p:cNvPr id="10" name="TextBox 9">
+              <a:extLst>
+                <a:ext uri="{FF2B5EF4-FFF2-40B4-BE49-F238E27FC236}">
+                  <a16:creationId xmlns:a16="http://schemas.microsoft.com/office/drawing/2014/main" id="{527F79EE-07C5-474D-B1A6-C9605593C995}"/>
+                </a:ext>
+              </a:extLst>
+            </p:cNvPr>
+            <p:cNvSpPr txBox="1"/>
+            <p:nvPr/>
+          </p:nvSpPr>
+          <p:spPr>
+            <a:xfrm>
+              <a:off x="3471004" y="2615515"/>
+              <a:ext cx="1974130" cy="646331"/>
+            </a:xfrm>
+            <a:prstGeom prst="rect">
+              <a:avLst/>
+            </a:prstGeom>
+            <a:noFill/>
+          </p:spPr>
+          <p:txBody>
+            <a:bodyPr wrap="none" rtlCol="0">
+              <a:spAutoFit/>
+            </a:bodyPr>
+            <a:lstStyle/>
+            <a:p>
+              <a:pPr algn="ctr"/>
+              <a:r>
+                <a:rPr lang="en-US" dirty="0"/>
+                <a:t>Photon Generation</a:t>
+              </a:r>
+              <a:br>
+                <a:rPr lang="en-US" dirty="0"/>
+              </a:br>
+              <a:r>
+                <a:rPr lang="en-US" dirty="0"/>
+                <a:t> and Traversal</a:t>
+              </a:r>
+            </a:p>
+          </p:txBody>
+        </p:sp>
+        <p:sp>
+          <p:nvSpPr>
+            <p:cNvPr id="12" name="TextBox 11">
+              <a:extLst>
+                <a:ext uri="{FF2B5EF4-FFF2-40B4-BE49-F238E27FC236}">
+                  <a16:creationId xmlns:a16="http://schemas.microsoft.com/office/drawing/2014/main" id="{7DCC89AA-D51A-49E2-94AE-39FC61539A5B}"/>
+                </a:ext>
+              </a:extLst>
+            </p:cNvPr>
+            <p:cNvSpPr txBox="1"/>
+            <p:nvPr/>
+          </p:nvSpPr>
+          <p:spPr>
+            <a:xfrm>
+              <a:off x="6515499" y="2739830"/>
+              <a:ext cx="1330301" cy="369332"/>
+            </a:xfrm>
+            <a:prstGeom prst="rect">
+              <a:avLst/>
+            </a:prstGeom>
+            <a:noFill/>
+          </p:spPr>
+          <p:txBody>
+            <a:bodyPr wrap="none" rtlCol="0">
+              <a:spAutoFit/>
+            </a:bodyPr>
+            <a:lstStyle/>
+            <a:p>
+              <a:pPr algn="ctr"/>
+              <a:r>
+                <a:rPr lang="en-US" dirty="0"/>
+                <a:t>Final Gather</a:t>
+              </a:r>
+            </a:p>
+          </p:txBody>
+        </p:sp>
+        <p:sp>
+          <p:nvSpPr>
+            <p:cNvPr id="16" name="TextBox 15">
+              <a:extLst>
+                <a:ext uri="{FF2B5EF4-FFF2-40B4-BE49-F238E27FC236}">
+                  <a16:creationId xmlns:a16="http://schemas.microsoft.com/office/drawing/2014/main" id="{7D024A4D-EB40-437A-A95D-73C66EC9B5A3}"/>
+                </a:ext>
+              </a:extLst>
+            </p:cNvPr>
+            <p:cNvSpPr txBox="1"/>
+            <p:nvPr/>
+          </p:nvSpPr>
+          <p:spPr>
+            <a:xfrm>
+              <a:off x="1342951" y="4407282"/>
+              <a:ext cx="1382493" cy="646331"/>
+            </a:xfrm>
+            <a:prstGeom prst="rect">
+              <a:avLst/>
+            </a:prstGeom>
+            <a:noFill/>
+          </p:spPr>
+          <p:txBody>
+            <a:bodyPr wrap="none" rtlCol="0">
+              <a:spAutoFit/>
+            </a:bodyPr>
+            <a:lstStyle/>
+            <a:p>
+              <a:pPr algn="ctr"/>
+              <a:r>
+                <a:rPr lang="en-US" dirty="0">
+                  <a:solidFill>
+                    <a:schemeClr val="bg1"/>
+                  </a:solidFill>
+                </a:rPr>
+                <a:t>Ray Dispatch</a:t>
+              </a:r>
+              <a:br>
+                <a:rPr lang="en-US" dirty="0">
+                  <a:solidFill>
+                    <a:schemeClr val="bg1"/>
+                  </a:solidFill>
+                </a:rPr>
+              </a:br>
+              <a:r>
+                <a:rPr lang="en-US" dirty="0">
+                  <a:solidFill>
+                    <a:schemeClr val="bg1"/>
+                  </a:solidFill>
+                </a:rPr>
+                <a:t> Parameters</a:t>
+              </a:r>
+            </a:p>
+          </p:txBody>
+        </p:sp>
+        <p:grpSp>
+          <p:nvGrpSpPr>
+            <p:cNvPr id="51" name="Group 50">
+              <a:extLst>
+                <a:ext uri="{FF2B5EF4-FFF2-40B4-BE49-F238E27FC236}">
+                  <a16:creationId xmlns:a16="http://schemas.microsoft.com/office/drawing/2014/main" id="{F6ED9F50-CA19-426B-884B-99B7C0DB4E3D}"/>
+                </a:ext>
+              </a:extLst>
+            </p:cNvPr>
+            <p:cNvGrpSpPr/>
+            <p:nvPr/>
+          </p:nvGrpSpPr>
+          <p:grpSpPr>
+            <a:xfrm>
+              <a:off x="3530382" y="4082069"/>
+              <a:ext cx="1748772" cy="1262289"/>
+              <a:chOff x="2660371" y="2457455"/>
+              <a:chExt cx="1748772" cy="1262289"/>
+            </a:xfrm>
+          </p:grpSpPr>
+          <p:sp>
+            <p:nvSpPr>
+              <p:cNvPr id="45" name="Rectangle 44">
+                <a:extLst>
+                  <a:ext uri="{FF2B5EF4-FFF2-40B4-BE49-F238E27FC236}">
+                    <a16:creationId xmlns:a16="http://schemas.microsoft.com/office/drawing/2014/main" id="{805E7D3D-81C4-4A2B-819D-574FEB4F0DE1}"/>
+                  </a:ext>
+                </a:extLst>
+              </p:cNvPr>
+              <p:cNvSpPr/>
+              <p:nvPr/>
+            </p:nvSpPr>
+            <p:spPr>
+              <a:xfrm>
+                <a:off x="2660371" y="2457455"/>
+                <a:ext cx="1671963" cy="1262289"/>
+              </a:xfrm>
+              <a:prstGeom prst="rect">
+                <a:avLst/>
+              </a:prstGeom>
+            </p:spPr>
+            <p:style>
+              <a:lnRef idx="2">
+                <a:schemeClr val="accent1">
+                  <a:shade val="50000"/>
+                </a:schemeClr>
+              </a:lnRef>
+              <a:fillRef idx="1">
+                <a:schemeClr val="accent1"/>
+              </a:fillRef>
+              <a:effectRef idx="0">
+                <a:schemeClr val="accent1"/>
+              </a:effectRef>
+              <a:fontRef idx="minor">
+                <a:schemeClr val="lt1"/>
+              </a:fontRef>
+            </p:style>
+            <p:txBody>
+              <a:bodyPr rtlCol="0" anchor="ctr"/>
+              <a:lstStyle/>
+              <a:p>
+                <a:pPr algn="ctr"/>
+                <a:endParaRPr lang="en-US"/>
+              </a:p>
+            </p:txBody>
+          </p:sp>
+          <p:sp>
+            <p:nvSpPr>
+              <p:cNvPr id="46" name="TextBox 45">
+                <a:extLst>
+                  <a:ext uri="{FF2B5EF4-FFF2-40B4-BE49-F238E27FC236}">
+                    <a16:creationId xmlns:a16="http://schemas.microsoft.com/office/drawing/2014/main" id="{A88792EF-768E-4129-B663-09223EFBCB1D}"/>
+                  </a:ext>
+                </a:extLst>
+              </p:cNvPr>
+              <p:cNvSpPr txBox="1"/>
+              <p:nvPr/>
+            </p:nvSpPr>
+            <p:spPr>
+              <a:xfrm>
+                <a:off x="2700835" y="2457455"/>
+                <a:ext cx="1708308" cy="523220"/>
+              </a:xfrm>
+              <a:prstGeom prst="rect">
+                <a:avLst/>
+              </a:prstGeom>
+              <a:noFill/>
+            </p:spPr>
+            <p:txBody>
+              <a:bodyPr wrap="square" rtlCol="0">
+                <a:spAutoFit/>
+              </a:bodyPr>
+              <a:lstStyle/>
+              <a:p>
+                <a:pPr algn="ctr"/>
+                <a:r>
+                  <a:rPr lang="en-US" sz="1400" b="1" dirty="0"/>
+                  <a:t>Width</a:t>
+                </a:r>
+                <a:r>
+                  <a:rPr lang="en-US" sz="1400" dirty="0"/>
+                  <a:t> : sqrt(numPhotons)</a:t>
+                </a:r>
+              </a:p>
+            </p:txBody>
+          </p:sp>
+          <p:sp>
+            <p:nvSpPr>
+              <p:cNvPr id="49" name="TextBox 48">
+                <a:extLst>
+                  <a:ext uri="{FF2B5EF4-FFF2-40B4-BE49-F238E27FC236}">
+                    <a16:creationId xmlns:a16="http://schemas.microsoft.com/office/drawing/2014/main" id="{354A2C09-918E-45DA-8A3B-1AD0A4FED8FF}"/>
+                  </a:ext>
+                </a:extLst>
+              </p:cNvPr>
+              <p:cNvSpPr txBox="1"/>
+              <p:nvPr/>
+            </p:nvSpPr>
+            <p:spPr>
+              <a:xfrm>
+                <a:off x="2684494" y="2883471"/>
+                <a:ext cx="1708308" cy="523220"/>
+              </a:xfrm>
+              <a:prstGeom prst="rect">
+                <a:avLst/>
+              </a:prstGeom>
+              <a:noFill/>
+            </p:spPr>
+            <p:txBody>
+              <a:bodyPr wrap="square" rtlCol="0">
+                <a:spAutoFit/>
+              </a:bodyPr>
+              <a:lstStyle/>
+              <a:p>
+                <a:pPr algn="ctr"/>
+                <a:r>
+                  <a:rPr lang="en-US" sz="1400" b="1" dirty="0"/>
+                  <a:t>Height</a:t>
+                </a:r>
+                <a:r>
+                  <a:rPr lang="en-US" sz="1400" dirty="0"/>
+                  <a:t> : sqrt(numPhotons)</a:t>
+                </a:r>
+              </a:p>
+            </p:txBody>
+          </p:sp>
+          <p:sp>
+            <p:nvSpPr>
+              <p:cNvPr id="50" name="TextBox 49">
+                <a:extLst>
+                  <a:ext uri="{FF2B5EF4-FFF2-40B4-BE49-F238E27FC236}">
+                    <a16:creationId xmlns:a16="http://schemas.microsoft.com/office/drawing/2014/main" id="{70393A1C-8D95-4E0C-9274-2DE1D7A7E8AD}"/>
+                  </a:ext>
+                </a:extLst>
+              </p:cNvPr>
+              <p:cNvSpPr txBox="1"/>
+              <p:nvPr/>
+            </p:nvSpPr>
+            <p:spPr>
+              <a:xfrm>
+                <a:off x="2676712" y="3344424"/>
+                <a:ext cx="1708308" cy="307777"/>
+              </a:xfrm>
+              <a:prstGeom prst="rect">
+                <a:avLst/>
+              </a:prstGeom>
+              <a:noFill/>
+            </p:spPr>
+            <p:txBody>
+              <a:bodyPr wrap="square" rtlCol="0">
+                <a:spAutoFit/>
+              </a:bodyPr>
+              <a:lstStyle/>
+              <a:p>
+                <a:pPr algn="ctr"/>
+                <a:r>
+                  <a:rPr lang="en-US" sz="1400" b="1" dirty="0"/>
+                  <a:t>Depth</a:t>
+                </a:r>
+                <a:r>
+                  <a:rPr lang="en-US" sz="1400" dirty="0"/>
+                  <a:t> : MaxBounces</a:t>
+                </a:r>
+              </a:p>
+            </p:txBody>
+          </p:sp>
+        </p:grpSp>
+        <p:grpSp>
+          <p:nvGrpSpPr>
+            <p:cNvPr id="67" name="Group 66">
+              <a:extLst>
+                <a:ext uri="{FF2B5EF4-FFF2-40B4-BE49-F238E27FC236}">
+                  <a16:creationId xmlns:a16="http://schemas.microsoft.com/office/drawing/2014/main" id="{42C5AFB2-7C6F-4D0A-9AF3-377125D4455C}"/>
+                </a:ext>
+              </a:extLst>
+            </p:cNvPr>
+            <p:cNvGrpSpPr/>
+            <p:nvPr/>
+          </p:nvGrpSpPr>
+          <p:grpSpPr>
+            <a:xfrm>
+              <a:off x="6382741" y="4079102"/>
+              <a:ext cx="1838287" cy="1262289"/>
+              <a:chOff x="2611721" y="2457455"/>
+              <a:chExt cx="1838287" cy="1262289"/>
+            </a:xfrm>
+          </p:grpSpPr>
+          <p:sp>
+            <p:nvSpPr>
+              <p:cNvPr id="68" name="Rectangle 67">
+                <a:extLst>
+                  <a:ext uri="{FF2B5EF4-FFF2-40B4-BE49-F238E27FC236}">
+                    <a16:creationId xmlns:a16="http://schemas.microsoft.com/office/drawing/2014/main" id="{7E9FD372-3214-4916-A6EE-887179228AAE}"/>
+                  </a:ext>
+                </a:extLst>
+              </p:cNvPr>
+              <p:cNvSpPr/>
+              <p:nvPr/>
+            </p:nvSpPr>
+            <p:spPr>
+              <a:xfrm>
+                <a:off x="2660371" y="2457455"/>
+                <a:ext cx="1671963" cy="1262289"/>
+              </a:xfrm>
+              <a:prstGeom prst="rect">
+                <a:avLst/>
+              </a:prstGeom>
+            </p:spPr>
+            <p:style>
+              <a:lnRef idx="2">
+                <a:schemeClr val="accent1">
+                  <a:shade val="50000"/>
+                </a:schemeClr>
+              </a:lnRef>
+              <a:fillRef idx="1">
+                <a:schemeClr val="accent1"/>
+              </a:fillRef>
+              <a:effectRef idx="0">
+                <a:schemeClr val="accent1"/>
+              </a:effectRef>
+              <a:fontRef idx="minor">
+                <a:schemeClr val="lt1"/>
+              </a:fontRef>
+            </p:style>
+            <p:txBody>
+              <a:bodyPr rtlCol="0" anchor="ctr"/>
+              <a:lstStyle/>
+              <a:p>
+                <a:pPr algn="ctr"/>
+                <a:endParaRPr lang="en-US"/>
+              </a:p>
+            </p:txBody>
+          </p:sp>
+          <p:sp>
+            <p:nvSpPr>
+              <p:cNvPr id="69" name="TextBox 68">
+                <a:extLst>
+                  <a:ext uri="{FF2B5EF4-FFF2-40B4-BE49-F238E27FC236}">
+                    <a16:creationId xmlns:a16="http://schemas.microsoft.com/office/drawing/2014/main" id="{2C61262B-6017-4515-A45B-650223D7C4F5}"/>
+                  </a:ext>
+                </a:extLst>
+              </p:cNvPr>
+              <p:cNvSpPr txBox="1"/>
+              <p:nvPr/>
+            </p:nvSpPr>
+            <p:spPr>
+              <a:xfrm>
+                <a:off x="2639819" y="2476580"/>
+                <a:ext cx="1708308" cy="307777"/>
+              </a:xfrm>
+              <a:prstGeom prst="rect">
+                <a:avLst/>
+              </a:prstGeom>
+              <a:noFill/>
+            </p:spPr>
+            <p:txBody>
+              <a:bodyPr wrap="square" rtlCol="0">
+                <a:spAutoFit/>
+              </a:bodyPr>
+              <a:lstStyle/>
+              <a:p>
+                <a:r>
+                  <a:rPr lang="en-US" sz="1400" b="1" dirty="0"/>
+                  <a:t>Width</a:t>
+                </a:r>
+                <a:r>
+                  <a:rPr lang="en-US" sz="1400" dirty="0"/>
+                  <a:t> : ScreenWidth</a:t>
+                </a:r>
+              </a:p>
+            </p:txBody>
+          </p:sp>
+          <p:sp>
+            <p:nvSpPr>
+              <p:cNvPr id="70" name="TextBox 69">
+                <a:extLst>
+                  <a:ext uri="{FF2B5EF4-FFF2-40B4-BE49-F238E27FC236}">
+                    <a16:creationId xmlns:a16="http://schemas.microsoft.com/office/drawing/2014/main" id="{0BFD17F3-3E28-4DBF-8082-091F07ABFBE3}"/>
+                  </a:ext>
+                </a:extLst>
+              </p:cNvPr>
+              <p:cNvSpPr txBox="1"/>
+              <p:nvPr/>
+            </p:nvSpPr>
+            <p:spPr>
+              <a:xfrm>
+                <a:off x="2611721" y="2875695"/>
+                <a:ext cx="1838287" cy="307777"/>
+              </a:xfrm>
+              <a:prstGeom prst="rect">
+                <a:avLst/>
+              </a:prstGeom>
+              <a:noFill/>
+            </p:spPr>
+            <p:txBody>
+              <a:bodyPr wrap="square" rtlCol="0">
+                <a:spAutoFit/>
+              </a:bodyPr>
+              <a:lstStyle/>
+              <a:p>
+                <a:r>
+                  <a:rPr lang="en-US" sz="1400" b="1" dirty="0"/>
+                  <a:t>Height</a:t>
+                </a:r>
+                <a:r>
+                  <a:rPr lang="en-US" sz="1400" dirty="0"/>
+                  <a:t> : ScreenHeight</a:t>
+                </a:r>
+              </a:p>
+            </p:txBody>
+          </p:sp>
+          <p:sp>
+            <p:nvSpPr>
+              <p:cNvPr id="71" name="TextBox 70">
+                <a:extLst>
+                  <a:ext uri="{FF2B5EF4-FFF2-40B4-BE49-F238E27FC236}">
+                    <a16:creationId xmlns:a16="http://schemas.microsoft.com/office/drawing/2014/main" id="{57E33C97-6F07-4AA6-8769-4E491ED9116F}"/>
+                  </a:ext>
+                </a:extLst>
+              </p:cNvPr>
+              <p:cNvSpPr txBox="1"/>
+              <p:nvPr/>
+            </p:nvSpPr>
+            <p:spPr>
+              <a:xfrm>
+                <a:off x="2694450" y="3253203"/>
+                <a:ext cx="1708308" cy="307777"/>
+              </a:xfrm>
+              <a:prstGeom prst="rect">
+                <a:avLst/>
+              </a:prstGeom>
+              <a:noFill/>
+            </p:spPr>
+            <p:txBody>
+              <a:bodyPr wrap="square" rtlCol="0">
+                <a:spAutoFit/>
+              </a:bodyPr>
+              <a:lstStyle/>
+              <a:p>
+                <a:pPr algn="ctr"/>
+                <a:r>
+                  <a:rPr lang="en-US" sz="1400" b="1" dirty="0"/>
+                  <a:t>Depth</a:t>
+                </a:r>
+                <a:r>
+                  <a:rPr lang="en-US" sz="1400" dirty="0"/>
+                  <a:t> : 1</a:t>
+                </a:r>
+              </a:p>
+            </p:txBody>
+          </p:sp>
+        </p:grpSp>
+        <p:sp>
+          <p:nvSpPr>
+            <p:cNvPr id="77" name="TextBox 76">
+              <a:extLst>
+                <a:ext uri="{FF2B5EF4-FFF2-40B4-BE49-F238E27FC236}">
+                  <a16:creationId xmlns:a16="http://schemas.microsoft.com/office/drawing/2014/main" id="{607D87FC-4E76-4676-8002-59FD2C19DB96}"/>
+                </a:ext>
+              </a:extLst>
+            </p:cNvPr>
+            <p:cNvSpPr txBox="1"/>
+            <p:nvPr/>
+          </p:nvSpPr>
+          <p:spPr>
+            <a:xfrm>
+              <a:off x="3650103" y="2072375"/>
+              <a:ext cx="1604928" cy="369332"/>
+            </a:xfrm>
+            <a:prstGeom prst="rect">
+              <a:avLst/>
+            </a:prstGeom>
+            <a:noFill/>
+          </p:spPr>
+          <p:txBody>
+            <a:bodyPr wrap="none" rtlCol="0">
+              <a:spAutoFit/>
+            </a:bodyPr>
+            <a:lstStyle/>
+            <a:p>
+              <a:pPr algn="ctr"/>
+              <a:r>
+                <a:rPr lang="en-US" i="1" dirty="0">
+                  <a:solidFill>
+                    <a:schemeClr val="bg1"/>
+                  </a:solidFill>
+                </a:rPr>
+                <a:t>once per scene</a:t>
+              </a:r>
+            </a:p>
+          </p:txBody>
+        </p:sp>
+        <p:sp>
+          <p:nvSpPr>
+            <p:cNvPr id="78" name="TextBox 77">
+              <a:extLst>
+                <a:ext uri="{FF2B5EF4-FFF2-40B4-BE49-F238E27FC236}">
+                  <a16:creationId xmlns:a16="http://schemas.microsoft.com/office/drawing/2014/main" id="{ED8C8E61-5E37-4FA9-9B8D-44DF2CB82317}"/>
+                </a:ext>
+              </a:extLst>
+            </p:cNvPr>
+            <p:cNvSpPr txBox="1"/>
+            <p:nvPr/>
+          </p:nvSpPr>
+          <p:spPr>
+            <a:xfrm>
+              <a:off x="6528996" y="2075082"/>
+              <a:ext cx="1303306" cy="369332"/>
+            </a:xfrm>
+            <a:prstGeom prst="rect">
+              <a:avLst/>
+            </a:prstGeom>
+            <a:noFill/>
+          </p:spPr>
+          <p:txBody>
+            <a:bodyPr wrap="none" rtlCol="0">
+              <a:spAutoFit/>
+            </a:bodyPr>
+            <a:lstStyle/>
+            <a:p>
+              <a:pPr algn="ctr"/>
+              <a:r>
+                <a:rPr lang="en-US" i="1" dirty="0">
+                  <a:solidFill>
+                    <a:schemeClr val="bg1"/>
+                  </a:solidFill>
+                </a:rPr>
+                <a:t>every frame</a:t>
+              </a:r>
+            </a:p>
+          </p:txBody>
+        </p:sp>
+        <p:sp>
+          <p:nvSpPr>
+            <p:cNvPr id="79" name="TextBox 78">
+              <a:extLst>
+                <a:ext uri="{FF2B5EF4-FFF2-40B4-BE49-F238E27FC236}">
+                  <a16:creationId xmlns:a16="http://schemas.microsoft.com/office/drawing/2014/main" id="{9250683C-A166-429A-9B0A-75F34423C84E}"/>
+                </a:ext>
+              </a:extLst>
+            </p:cNvPr>
+            <p:cNvSpPr txBox="1"/>
+            <p:nvPr/>
+          </p:nvSpPr>
+          <p:spPr>
+            <a:xfrm>
+              <a:off x="4601312" y="1369040"/>
+              <a:ext cx="2980624" cy="369332"/>
+            </a:xfrm>
+            <a:prstGeom prst="rect">
+              <a:avLst/>
+            </a:prstGeom>
+            <a:noFill/>
+          </p:spPr>
+          <p:txBody>
+            <a:bodyPr wrap="none" rtlCol="0">
+              <a:spAutoFit/>
+            </a:bodyPr>
+            <a:lstStyle/>
+            <a:p>
+              <a:r>
+                <a:rPr lang="en-US" b="1" dirty="0">
+                  <a:solidFill>
+                    <a:schemeClr val="bg1"/>
+                  </a:solidFill>
+                </a:rPr>
+                <a:t>Pixel Major Iterator Renderer</a:t>
+              </a:r>
+            </a:p>
+          </p:txBody>
+        </p:sp>
+      </p:grpSp>
+    </p:spTree>
+    <p:extLst>
+      <p:ext uri="{BB962C8B-B14F-4D97-AF65-F5344CB8AC3E}">
+        <p14:creationId xmlns:p14="http://schemas.microsoft.com/office/powerpoint/2010/main" val="3028053189"/>
+      </p:ext>
+    </p:extLst>
+  </p:cSld>
+  <p:clrMapOvr>
+    <a:masterClrMapping/>
+  </p:clrMapOvr>
+</p:sld>
+</file>
+
 <file path=ppt/theme/theme1.xml><?xml version="1.0" encoding="utf-8"?>
 <a:theme xmlns:a="http://schemas.openxmlformats.org/drawingml/2006/main" name="Office Theme">
   <a:themeElements>

</xml_diff>